<commit_message>
Add datacreation step in Azure ml Studio
</commit_message>
<xml_diff>
--- a/Fraud-Detection/fraud-detect.pptx
+++ b/Fraud-Detection/fraud-detect.pptx
@@ -6,6 +6,7 @@
   </p:sldMasterIdLst>
   <p:sldIdLst>
     <p:sldId id="256" r:id="rId2"/>
+    <p:sldId id="257" r:id="rId3"/>
   </p:sldIdLst>
   <p:sldSz cx="12192000" cy="6858000"/>
   <p:notesSz cx="6858000" cy="9144000"/>
@@ -3344,6 +3345,226 @@
       </p:grpSpPr>
       <p:sp>
         <p:nvSpPr>
+          <p:cNvPr id="62" name="Rounded Rectangle 61">
+            <a:extLst>
+              <a:ext uri="{FF2B5EF4-FFF2-40B4-BE49-F238E27FC236}">
+                <a16:creationId xmlns:a16="http://schemas.microsoft.com/office/drawing/2014/main" id="{135754E0-7542-394D-A9BA-B0464AAD2A69}"/>
+              </a:ext>
+            </a:extLst>
+          </p:cNvPr>
+          <p:cNvSpPr/>
+          <p:nvPr/>
+        </p:nvSpPr>
+        <p:spPr>
+          <a:xfrm>
+            <a:off x="472743" y="4586203"/>
+            <a:ext cx="1898750" cy="1710519"/>
+          </a:xfrm>
+          <a:prstGeom prst="roundRect">
+            <a:avLst/>
+          </a:prstGeom>
+          <a:solidFill>
+            <a:schemeClr val="accent1">
+              <a:lumMod val="20000"/>
+              <a:lumOff val="80000"/>
+            </a:schemeClr>
+          </a:solidFill>
+          <a:ln>
+            <a:noFill/>
+          </a:ln>
+        </p:spPr>
+        <p:style>
+          <a:lnRef idx="2">
+            <a:schemeClr val="accent1">
+              <a:shade val="50000"/>
+            </a:schemeClr>
+          </a:lnRef>
+          <a:fillRef idx="1">
+            <a:schemeClr val="accent1"/>
+          </a:fillRef>
+          <a:effectRef idx="0">
+            <a:schemeClr val="accent1"/>
+          </a:effectRef>
+          <a:fontRef idx="minor">
+            <a:schemeClr val="lt1"/>
+          </a:fontRef>
+        </p:style>
+        <p:txBody>
+          <a:bodyPr rtlCol="0" anchor="ctr"/>
+          <a:lstStyle/>
+          <a:p>
+            <a:pPr algn="ctr"/>
+            <a:endParaRPr lang="en-TH"/>
+          </a:p>
+        </p:txBody>
+      </p:sp>
+      <p:sp>
+        <p:nvSpPr>
+          <p:cNvPr id="56" name="Rounded Rectangle 55">
+            <a:extLst>
+              <a:ext uri="{FF2B5EF4-FFF2-40B4-BE49-F238E27FC236}">
+                <a16:creationId xmlns:a16="http://schemas.microsoft.com/office/drawing/2014/main" id="{48F88E7B-8A45-C144-8BA9-9C14C6681C24}"/>
+              </a:ext>
+            </a:extLst>
+          </p:cNvPr>
+          <p:cNvSpPr/>
+          <p:nvPr/>
+        </p:nvSpPr>
+        <p:spPr>
+          <a:xfrm>
+            <a:off x="4378708" y="3597434"/>
+            <a:ext cx="1884482" cy="1620449"/>
+          </a:xfrm>
+          <a:prstGeom prst="roundRect">
+            <a:avLst/>
+          </a:prstGeom>
+          <a:solidFill>
+            <a:schemeClr val="accent1">
+              <a:lumMod val="20000"/>
+              <a:lumOff val="80000"/>
+            </a:schemeClr>
+          </a:solidFill>
+          <a:ln>
+            <a:noFill/>
+          </a:ln>
+        </p:spPr>
+        <p:style>
+          <a:lnRef idx="2">
+            <a:schemeClr val="accent1">
+              <a:shade val="50000"/>
+            </a:schemeClr>
+          </a:lnRef>
+          <a:fillRef idx="1">
+            <a:schemeClr val="accent1"/>
+          </a:fillRef>
+          <a:effectRef idx="0">
+            <a:schemeClr val="accent1"/>
+          </a:effectRef>
+          <a:fontRef idx="minor">
+            <a:schemeClr val="lt1"/>
+          </a:fontRef>
+        </p:style>
+        <p:txBody>
+          <a:bodyPr rtlCol="0" anchor="ctr"/>
+          <a:lstStyle/>
+          <a:p>
+            <a:pPr algn="ctr"/>
+            <a:endParaRPr lang="en-TH"/>
+          </a:p>
+        </p:txBody>
+      </p:sp>
+      <p:sp>
+        <p:nvSpPr>
+          <p:cNvPr id="55" name="Rounded Rectangle 54">
+            <a:extLst>
+              <a:ext uri="{FF2B5EF4-FFF2-40B4-BE49-F238E27FC236}">
+                <a16:creationId xmlns:a16="http://schemas.microsoft.com/office/drawing/2014/main" id="{7BAB30CD-1FB2-0944-A6BF-24D1A458D7E5}"/>
+              </a:ext>
+            </a:extLst>
+          </p:cNvPr>
+          <p:cNvSpPr/>
+          <p:nvPr/>
+        </p:nvSpPr>
+        <p:spPr>
+          <a:xfrm>
+            <a:off x="4603920" y="1393076"/>
+            <a:ext cx="1244812" cy="879760"/>
+          </a:xfrm>
+          <a:prstGeom prst="roundRect">
+            <a:avLst/>
+          </a:prstGeom>
+          <a:solidFill>
+            <a:schemeClr val="accent1">
+              <a:lumMod val="20000"/>
+              <a:lumOff val="80000"/>
+            </a:schemeClr>
+          </a:solidFill>
+          <a:ln>
+            <a:noFill/>
+          </a:ln>
+        </p:spPr>
+        <p:style>
+          <a:lnRef idx="2">
+            <a:schemeClr val="accent1">
+              <a:shade val="50000"/>
+            </a:schemeClr>
+          </a:lnRef>
+          <a:fillRef idx="1">
+            <a:schemeClr val="accent1"/>
+          </a:fillRef>
+          <a:effectRef idx="0">
+            <a:schemeClr val="accent1"/>
+          </a:effectRef>
+          <a:fontRef idx="minor">
+            <a:schemeClr val="lt1"/>
+          </a:fontRef>
+        </p:style>
+        <p:txBody>
+          <a:bodyPr rtlCol="0" anchor="ctr"/>
+          <a:lstStyle/>
+          <a:p>
+            <a:pPr algn="ctr"/>
+            <a:endParaRPr lang="en-TH" dirty="0"/>
+          </a:p>
+        </p:txBody>
+      </p:sp>
+      <p:sp>
+        <p:nvSpPr>
+          <p:cNvPr id="26" name="Rounded Rectangle 25">
+            <a:extLst>
+              <a:ext uri="{FF2B5EF4-FFF2-40B4-BE49-F238E27FC236}">
+                <a16:creationId xmlns:a16="http://schemas.microsoft.com/office/drawing/2014/main" id="{4A6EDCFF-B07B-D444-9F1D-4179E8E71DCE}"/>
+              </a:ext>
+            </a:extLst>
+          </p:cNvPr>
+          <p:cNvSpPr/>
+          <p:nvPr/>
+        </p:nvSpPr>
+        <p:spPr>
+          <a:xfrm>
+            <a:off x="1304286" y="2595322"/>
+            <a:ext cx="3010876" cy="879760"/>
+          </a:xfrm>
+          <a:prstGeom prst="roundRect">
+            <a:avLst/>
+          </a:prstGeom>
+          <a:solidFill>
+            <a:schemeClr val="accent1">
+              <a:lumMod val="20000"/>
+              <a:lumOff val="80000"/>
+            </a:schemeClr>
+          </a:solidFill>
+          <a:ln>
+            <a:noFill/>
+          </a:ln>
+        </p:spPr>
+        <p:style>
+          <a:lnRef idx="2">
+            <a:schemeClr val="accent1">
+              <a:shade val="50000"/>
+            </a:schemeClr>
+          </a:lnRef>
+          <a:fillRef idx="1">
+            <a:schemeClr val="accent1"/>
+          </a:fillRef>
+          <a:effectRef idx="0">
+            <a:schemeClr val="accent1"/>
+          </a:effectRef>
+          <a:fontRef idx="minor">
+            <a:schemeClr val="lt1"/>
+          </a:fontRef>
+        </p:style>
+        <p:txBody>
+          <a:bodyPr rtlCol="0" anchor="ctr"/>
+          <a:lstStyle/>
+          <a:p>
+            <a:pPr algn="ctr"/>
+            <a:endParaRPr lang="en-TH"/>
+          </a:p>
+        </p:txBody>
+      </p:sp>
+      <p:sp>
+        <p:nvSpPr>
           <p:cNvPr id="3" name="Subtitle 2">
             <a:extLst>
               <a:ext uri="{FF2B5EF4-FFF2-40B4-BE49-F238E27FC236}">
@@ -3361,7 +3582,7 @@
         <p:spPr>
           <a:xfrm>
             <a:off x="388882" y="480466"/>
-            <a:ext cx="8029904" cy="486486"/>
+            <a:ext cx="6877968" cy="486486"/>
           </a:xfrm>
         </p:spPr>
         <p:txBody>
@@ -3372,15 +3593,2275 @@
           <a:p>
             <a:r>
               <a:rPr lang="en-TH" dirty="0"/>
-              <a:t>IEEE CIS Fraud Detcection – Azure ML Pipeline Architectecture </a:t>
-            </a:r>
-          </a:p>
-        </p:txBody>
-      </p:sp>
+              <a:t>Fraud Detcection – Azure ML Pipeline Architecture </a:t>
+            </a:r>
+          </a:p>
+        </p:txBody>
+      </p:sp>
+      <p:pic>
+        <p:nvPicPr>
+          <p:cNvPr id="11" name="Graphic 10">
+            <a:extLst>
+              <a:ext uri="{FF2B5EF4-FFF2-40B4-BE49-F238E27FC236}">
+                <a16:creationId xmlns:a16="http://schemas.microsoft.com/office/drawing/2014/main" id="{BB85D9E2-B208-5946-AA5D-62E4A190056C}"/>
+              </a:ext>
+            </a:extLst>
+          </p:cNvPr>
+          <p:cNvPicPr>
+            <a:picLocks noChangeAspect="1"/>
+          </p:cNvPicPr>
+          <p:nvPr/>
+        </p:nvPicPr>
+        <p:blipFill>
+          <a:blip r:embed="rId2">
+            <a:extLst>
+              <a:ext uri="{96DAC541-7B7A-43D3-8B79-37D633B846F1}">
+                <asvg:svgBlip xmlns:asvg="http://schemas.microsoft.com/office/drawing/2016/SVG/main" r:embed="rId3"/>
+              </a:ext>
+            </a:extLst>
+          </a:blip>
+          <a:stretch>
+            <a:fillRect/>
+          </a:stretch>
+        </p:blipFill>
+        <p:spPr>
+          <a:xfrm>
+            <a:off x="1683743" y="4653884"/>
+            <a:ext cx="393491" cy="393491"/>
+          </a:xfrm>
+          <a:prstGeom prst="rect">
+            <a:avLst/>
+          </a:prstGeom>
+        </p:spPr>
+      </p:pic>
+      <p:pic>
+        <p:nvPicPr>
+          <p:cNvPr id="14" name="Graphic 13">
+            <a:extLst>
+              <a:ext uri="{FF2B5EF4-FFF2-40B4-BE49-F238E27FC236}">
+                <a16:creationId xmlns:a16="http://schemas.microsoft.com/office/drawing/2014/main" id="{3B6B6EA8-EE2E-384F-8D1C-774FA169CD03}"/>
+              </a:ext>
+            </a:extLst>
+          </p:cNvPr>
+          <p:cNvPicPr>
+            <a:picLocks noChangeAspect="1"/>
+          </p:cNvPicPr>
+          <p:nvPr/>
+        </p:nvPicPr>
+        <p:blipFill>
+          <a:blip r:embed="rId4">
+            <a:extLst>
+              <a:ext uri="{96DAC541-7B7A-43D3-8B79-37D633B846F1}">
+                <asvg:svgBlip xmlns:asvg="http://schemas.microsoft.com/office/drawing/2016/SVG/main" r:embed="rId5"/>
+              </a:ext>
+            </a:extLst>
+          </a:blip>
+          <a:stretch>
+            <a:fillRect/>
+          </a:stretch>
+        </p:blipFill>
+        <p:spPr>
+          <a:xfrm>
+            <a:off x="1934588" y="4242497"/>
+            <a:ext cx="316488" cy="316488"/>
+          </a:xfrm>
+          <a:prstGeom prst="rect">
+            <a:avLst/>
+          </a:prstGeom>
+        </p:spPr>
+      </p:pic>
+      <p:pic>
+        <p:nvPicPr>
+          <p:cNvPr id="1036" name="Picture 12" descr="IoT Summit 2020">
+            <a:extLst>
+              <a:ext uri="{FF2B5EF4-FFF2-40B4-BE49-F238E27FC236}">
+                <a16:creationId xmlns:a16="http://schemas.microsoft.com/office/drawing/2014/main" id="{30BD5B6B-2147-5347-9D09-70357BF80EE4}"/>
+              </a:ext>
+            </a:extLst>
+          </p:cNvPr>
+          <p:cNvPicPr>
+            <a:picLocks noChangeAspect="1" noChangeArrowheads="1"/>
+          </p:cNvPicPr>
+          <p:nvPr/>
+        </p:nvPicPr>
+        <p:blipFill>
+          <a:blip r:embed="rId6">
+            <a:extLst>
+              <a:ext uri="{28A0092B-C50C-407E-A947-70E740481C1C}">
+                <a14:useLocalDpi xmlns:a14="http://schemas.microsoft.com/office/drawing/2010/main" val="0"/>
+              </a:ext>
+            </a:extLst>
+          </a:blip>
+          <a:srcRect/>
+          <a:stretch>
+            <a:fillRect/>
+          </a:stretch>
+        </p:blipFill>
+        <p:spPr bwMode="auto">
+          <a:xfrm>
+            <a:off x="1668034" y="5527634"/>
+            <a:ext cx="412579" cy="412579"/>
+          </a:xfrm>
+          <a:prstGeom prst="rect">
+            <a:avLst/>
+          </a:prstGeom>
+          <a:noFill/>
+          <a:extLst>
+            <a:ext uri="{909E8E84-426E-40DD-AFC4-6F175D3DCCD1}">
+              <a14:hiddenFill xmlns:a14="http://schemas.microsoft.com/office/drawing/2010/main">
+                <a:solidFill>
+                  <a:srgbClr val="FFFFFF"/>
+                </a:solidFill>
+              </a14:hiddenFill>
+            </a:ext>
+          </a:extLst>
+        </p:spPr>
+      </p:pic>
+      <p:pic>
+        <p:nvPicPr>
+          <p:cNvPr id="27" name="Graphic 26">
+            <a:extLst>
+              <a:ext uri="{FF2B5EF4-FFF2-40B4-BE49-F238E27FC236}">
+                <a16:creationId xmlns:a16="http://schemas.microsoft.com/office/drawing/2014/main" id="{1F4D33A2-11B2-A248-87D8-FFDE211ACE4B}"/>
+              </a:ext>
+            </a:extLst>
+          </p:cNvPr>
+          <p:cNvPicPr>
+            <a:picLocks noChangeAspect="1"/>
+          </p:cNvPicPr>
+          <p:nvPr/>
+        </p:nvPicPr>
+        <p:blipFill>
+          <a:blip r:embed="rId7">
+            <a:extLst>
+              <a:ext uri="{96DAC541-7B7A-43D3-8B79-37D633B846F1}">
+                <asvg:svgBlip xmlns:asvg="http://schemas.microsoft.com/office/drawing/2016/SVG/main" r:embed="rId8"/>
+              </a:ext>
+            </a:extLst>
+          </a:blip>
+          <a:stretch>
+            <a:fillRect/>
+          </a:stretch>
+        </p:blipFill>
+        <p:spPr>
+          <a:xfrm>
+            <a:off x="9212184" y="3728708"/>
+            <a:ext cx="1376024" cy="1376024"/>
+          </a:xfrm>
+          <a:prstGeom prst="rect">
+            <a:avLst/>
+          </a:prstGeom>
+        </p:spPr>
+      </p:pic>
+      <p:pic>
+        <p:nvPicPr>
+          <p:cNvPr id="1038" name="Picture 14" descr="Azure Storage Tutorial - An Introduction to Azure Storage | Edureka">
+            <a:extLst>
+              <a:ext uri="{FF2B5EF4-FFF2-40B4-BE49-F238E27FC236}">
+                <a16:creationId xmlns:a16="http://schemas.microsoft.com/office/drawing/2014/main" id="{8846E854-59AE-B743-8E8F-E0A630A85F76}"/>
+              </a:ext>
+            </a:extLst>
+          </p:cNvPr>
+          <p:cNvPicPr>
+            <a:picLocks noChangeAspect="1" noChangeArrowheads="1"/>
+          </p:cNvPicPr>
+          <p:nvPr/>
+        </p:nvPicPr>
+        <p:blipFill>
+          <a:blip r:embed="rId9">
+            <a:extLst>
+              <a:ext uri="{28A0092B-C50C-407E-A947-70E740481C1C}">
+                <a14:useLocalDpi xmlns:a14="http://schemas.microsoft.com/office/drawing/2010/main" val="0"/>
+              </a:ext>
+            </a:extLst>
+          </a:blip>
+          <a:srcRect/>
+          <a:stretch>
+            <a:fillRect/>
+          </a:stretch>
+        </p:blipFill>
+        <p:spPr bwMode="auto">
+          <a:xfrm flipH="1">
+            <a:off x="1628950" y="2719875"/>
+            <a:ext cx="490745" cy="490745"/>
+          </a:xfrm>
+          <a:prstGeom prst="rect">
+            <a:avLst/>
+          </a:prstGeom>
+          <a:noFill/>
+          <a:extLst>
+            <a:ext uri="{909E8E84-426E-40DD-AFC4-6F175D3DCCD1}">
+              <a14:hiddenFill xmlns:a14="http://schemas.microsoft.com/office/drawing/2010/main">
+                <a:solidFill>
+                  <a:srgbClr val="FFFFFF"/>
+                </a:solidFill>
+              </a14:hiddenFill>
+            </a:ext>
+          </a:extLst>
+        </p:spPr>
+      </p:pic>
+      <p:pic>
+        <p:nvPicPr>
+          <p:cNvPr id="23" name="Graphic 22">
+            <a:extLst>
+              <a:ext uri="{FF2B5EF4-FFF2-40B4-BE49-F238E27FC236}">
+                <a16:creationId xmlns:a16="http://schemas.microsoft.com/office/drawing/2014/main" id="{F27B807F-BCAA-AE4A-BB9C-250715F19C63}"/>
+              </a:ext>
+            </a:extLst>
+          </p:cNvPr>
+          <p:cNvPicPr>
+            <a:picLocks noChangeAspect="1"/>
+          </p:cNvPicPr>
+          <p:nvPr/>
+        </p:nvPicPr>
+        <p:blipFill>
+          <a:blip r:embed="rId10">
+            <a:extLst>
+              <a:ext uri="{96DAC541-7B7A-43D3-8B79-37D633B846F1}">
+                <asvg:svgBlip xmlns:asvg="http://schemas.microsoft.com/office/drawing/2016/SVG/main" r:embed="rId11"/>
+              </a:ext>
+            </a:extLst>
+          </a:blip>
+          <a:stretch>
+            <a:fillRect/>
+          </a:stretch>
+        </p:blipFill>
+        <p:spPr>
+          <a:xfrm>
+            <a:off x="10056765" y="2751007"/>
+            <a:ext cx="332926" cy="332926"/>
+          </a:xfrm>
+          <a:prstGeom prst="rect">
+            <a:avLst/>
+          </a:prstGeom>
+        </p:spPr>
+      </p:pic>
+      <p:grpSp>
+        <p:nvGrpSpPr>
+          <p:cNvPr id="30" name="Group 29">
+            <a:extLst>
+              <a:ext uri="{FF2B5EF4-FFF2-40B4-BE49-F238E27FC236}">
+                <a16:creationId xmlns:a16="http://schemas.microsoft.com/office/drawing/2014/main" id="{608E4F59-BAF5-3B46-8249-F9E10FBA817E}"/>
+              </a:ext>
+            </a:extLst>
+          </p:cNvPr>
+          <p:cNvGrpSpPr/>
+          <p:nvPr/>
+        </p:nvGrpSpPr>
+        <p:grpSpPr>
+          <a:xfrm>
+            <a:off x="535071" y="5091463"/>
+            <a:ext cx="744254" cy="753350"/>
+            <a:chOff x="535071" y="5091463"/>
+            <a:chExt cx="744254" cy="753350"/>
+          </a:xfrm>
+        </p:grpSpPr>
+        <p:pic>
+          <p:nvPicPr>
+            <p:cNvPr id="25" name="Graphic 24">
+              <a:extLst>
+                <a:ext uri="{FF2B5EF4-FFF2-40B4-BE49-F238E27FC236}">
+                  <a16:creationId xmlns:a16="http://schemas.microsoft.com/office/drawing/2014/main" id="{61B04363-90CB-CF48-BEB5-4F1A26F4A603}"/>
+                </a:ext>
+              </a:extLst>
+            </p:cNvPr>
+            <p:cNvPicPr>
+              <a:picLocks noChangeAspect="1"/>
+            </p:cNvPicPr>
+            <p:nvPr/>
+          </p:nvPicPr>
+          <p:blipFill>
+            <a:blip r:embed="rId12">
+              <a:extLst>
+                <a:ext uri="{96DAC541-7B7A-43D3-8B79-37D633B846F1}">
+                  <asvg:svgBlip xmlns:asvg="http://schemas.microsoft.com/office/drawing/2016/SVG/main" r:embed="rId13"/>
+                </a:ext>
+              </a:extLst>
+            </a:blip>
+            <a:stretch>
+              <a:fillRect/>
+            </a:stretch>
+          </p:blipFill>
+          <p:spPr>
+            <a:xfrm>
+              <a:off x="535071" y="5091463"/>
+              <a:ext cx="486486" cy="486486"/>
+            </a:xfrm>
+            <a:prstGeom prst="rect">
+              <a:avLst/>
+            </a:prstGeom>
+          </p:spPr>
+        </p:pic>
+        <p:pic>
+          <p:nvPicPr>
+            <p:cNvPr id="34" name="Graphic 33">
+              <a:extLst>
+                <a:ext uri="{FF2B5EF4-FFF2-40B4-BE49-F238E27FC236}">
+                  <a16:creationId xmlns:a16="http://schemas.microsoft.com/office/drawing/2014/main" id="{A452E50C-CC37-8B4C-9FAA-4AA52AD52C7E}"/>
+                </a:ext>
+              </a:extLst>
+            </p:cNvPr>
+            <p:cNvPicPr>
+              <a:picLocks noChangeAspect="1"/>
+            </p:cNvPicPr>
+            <p:nvPr/>
+          </p:nvPicPr>
+          <p:blipFill>
+            <a:blip r:embed="rId12">
+              <a:extLst>
+                <a:ext uri="{96DAC541-7B7A-43D3-8B79-37D633B846F1}">
+                  <asvg:svgBlip xmlns:asvg="http://schemas.microsoft.com/office/drawing/2016/SVG/main" r:embed="rId13"/>
+                </a:ext>
+              </a:extLst>
+            </a:blip>
+            <a:stretch>
+              <a:fillRect/>
+            </a:stretch>
+          </p:blipFill>
+          <p:spPr>
+            <a:xfrm>
+              <a:off x="644874" y="5224895"/>
+              <a:ext cx="486486" cy="486486"/>
+            </a:xfrm>
+            <a:prstGeom prst="rect">
+              <a:avLst/>
+            </a:prstGeom>
+          </p:spPr>
+        </p:pic>
+        <p:pic>
+          <p:nvPicPr>
+            <p:cNvPr id="35" name="Graphic 34">
+              <a:extLst>
+                <a:ext uri="{FF2B5EF4-FFF2-40B4-BE49-F238E27FC236}">
+                  <a16:creationId xmlns:a16="http://schemas.microsoft.com/office/drawing/2014/main" id="{315D73F1-9ACB-744A-A6A8-77B6B1C3E4BC}"/>
+                </a:ext>
+              </a:extLst>
+            </p:cNvPr>
+            <p:cNvPicPr>
+              <a:picLocks noChangeAspect="1"/>
+            </p:cNvPicPr>
+            <p:nvPr/>
+          </p:nvPicPr>
+          <p:blipFill>
+            <a:blip r:embed="rId12">
+              <a:extLst>
+                <a:ext uri="{96DAC541-7B7A-43D3-8B79-37D633B846F1}">
+                  <asvg:svgBlip xmlns:asvg="http://schemas.microsoft.com/office/drawing/2016/SVG/main" r:embed="rId13"/>
+                </a:ext>
+              </a:extLst>
+            </a:blip>
+            <a:stretch>
+              <a:fillRect/>
+            </a:stretch>
+          </p:blipFill>
+          <p:spPr>
+            <a:xfrm>
+              <a:off x="792839" y="5358327"/>
+              <a:ext cx="486486" cy="486486"/>
+            </a:xfrm>
+            <a:prstGeom prst="rect">
+              <a:avLst/>
+            </a:prstGeom>
+          </p:spPr>
+        </p:pic>
+      </p:grpSp>
+      <p:pic>
+        <p:nvPicPr>
+          <p:cNvPr id="36" name="Picture 14" descr="Azure Storage Tutorial - An Introduction to Azure Storage | Edureka">
+            <a:extLst>
+              <a:ext uri="{FF2B5EF4-FFF2-40B4-BE49-F238E27FC236}">
+                <a16:creationId xmlns:a16="http://schemas.microsoft.com/office/drawing/2014/main" id="{DFE1F79D-01BA-C84F-A5FF-6D81BA6E2026}"/>
+              </a:ext>
+            </a:extLst>
+          </p:cNvPr>
+          <p:cNvPicPr>
+            <a:picLocks noChangeAspect="1" noChangeArrowheads="1"/>
+          </p:cNvPicPr>
+          <p:nvPr/>
+        </p:nvPicPr>
+        <p:blipFill>
+          <a:blip r:embed="rId9">
+            <a:extLst>
+              <a:ext uri="{28A0092B-C50C-407E-A947-70E740481C1C}">
+                <a14:useLocalDpi xmlns:a14="http://schemas.microsoft.com/office/drawing/2010/main" val="0"/>
+              </a:ext>
+            </a:extLst>
+          </a:blip>
+          <a:srcRect/>
+          <a:stretch>
+            <a:fillRect/>
+          </a:stretch>
+        </p:blipFill>
+        <p:spPr bwMode="auto">
+          <a:xfrm flipH="1">
+            <a:off x="7971135" y="5149477"/>
+            <a:ext cx="561904" cy="561904"/>
+          </a:xfrm>
+          <a:prstGeom prst="rect">
+            <a:avLst/>
+          </a:prstGeom>
+          <a:noFill/>
+          <a:extLst>
+            <a:ext uri="{909E8E84-426E-40DD-AFC4-6F175D3DCCD1}">
+              <a14:hiddenFill xmlns:a14="http://schemas.microsoft.com/office/drawing/2010/main">
+                <a:solidFill>
+                  <a:srgbClr val="FFFFFF"/>
+                </a:solidFill>
+              </a14:hiddenFill>
+            </a:ext>
+          </a:extLst>
+        </p:spPr>
+      </p:pic>
+      <p:pic>
+        <p:nvPicPr>
+          <p:cNvPr id="1046" name="Picture 22">
+            <a:extLst>
+              <a:ext uri="{FF2B5EF4-FFF2-40B4-BE49-F238E27FC236}">
+                <a16:creationId xmlns:a16="http://schemas.microsoft.com/office/drawing/2014/main" id="{703565F2-1166-B641-9852-92656EF496CB}"/>
+              </a:ext>
+            </a:extLst>
+          </p:cNvPr>
+          <p:cNvPicPr>
+            <a:picLocks noChangeAspect="1" noChangeArrowheads="1"/>
+          </p:cNvPicPr>
+          <p:nvPr/>
+        </p:nvPicPr>
+        <p:blipFill>
+          <a:blip r:embed="rId14">
+            <a:extLst>
+              <a:ext uri="{28A0092B-C50C-407E-A947-70E740481C1C}">
+                <a14:useLocalDpi xmlns:a14="http://schemas.microsoft.com/office/drawing/2010/main" val="0"/>
+              </a:ext>
+            </a:extLst>
+          </a:blip>
+          <a:srcRect/>
+          <a:stretch>
+            <a:fillRect/>
+          </a:stretch>
+        </p:blipFill>
+        <p:spPr bwMode="auto">
+          <a:xfrm>
+            <a:off x="2684661" y="2718949"/>
+            <a:ext cx="440080" cy="510101"/>
+          </a:xfrm>
+          <a:prstGeom prst="rect">
+            <a:avLst/>
+          </a:prstGeom>
+          <a:noFill/>
+          <a:extLst>
+            <a:ext uri="{909E8E84-426E-40DD-AFC4-6F175D3DCCD1}">
+              <a14:hiddenFill xmlns:a14="http://schemas.microsoft.com/office/drawing/2010/main">
+                <a:solidFill>
+                  <a:srgbClr val="FFFFFF"/>
+                </a:solidFill>
+              </a14:hiddenFill>
+            </a:ext>
+          </a:extLst>
+        </p:spPr>
+      </p:pic>
+      <p:grpSp>
+        <p:nvGrpSpPr>
+          <p:cNvPr id="29" name="Group 28">
+            <a:extLst>
+              <a:ext uri="{FF2B5EF4-FFF2-40B4-BE49-F238E27FC236}">
+                <a16:creationId xmlns:a16="http://schemas.microsoft.com/office/drawing/2014/main" id="{29E53FF0-4F40-924B-8120-877AE94FE12D}"/>
+              </a:ext>
+            </a:extLst>
+          </p:cNvPr>
+          <p:cNvGrpSpPr/>
+          <p:nvPr/>
+        </p:nvGrpSpPr>
+        <p:grpSpPr>
+          <a:xfrm>
+            <a:off x="3925046" y="2309109"/>
+            <a:ext cx="458121" cy="394245"/>
+            <a:chOff x="3627237" y="2135301"/>
+            <a:chExt cx="662265" cy="569925"/>
+          </a:xfrm>
+        </p:grpSpPr>
+        <p:pic>
+          <p:nvPicPr>
+            <p:cNvPr id="1052" name="Picture 28" descr="Azureml Tensorflow 2.4 Inference GPU Image by Microsoft | Docker Hub">
+              <a:extLst>
+                <a:ext uri="{FF2B5EF4-FFF2-40B4-BE49-F238E27FC236}">
+                  <a16:creationId xmlns:a16="http://schemas.microsoft.com/office/drawing/2014/main" id="{D68DB8C7-61C9-1A4A-BA53-8B1EB8CF0FEC}"/>
+                </a:ext>
+              </a:extLst>
+            </p:cNvPr>
+            <p:cNvPicPr>
+              <a:picLocks noChangeAspect="1" noChangeArrowheads="1"/>
+            </p:cNvPicPr>
+            <p:nvPr/>
+          </p:nvPicPr>
+          <p:blipFill>
+            <a:blip r:embed="rId15">
+              <a:extLst>
+                <a:ext uri="{BEBA8EAE-BF5A-486C-A8C5-ECC9F3942E4B}">
+                  <a14:imgProps xmlns:a14="http://schemas.microsoft.com/office/drawing/2010/main">
+                    <a14:imgLayer r:embed="rId16">
+                      <a14:imgEffect>
+                        <a14:backgroundRemoval t="1778" b="96889" l="4000" r="93778">
+                          <a14:foregroundMark x1="56444" y1="6667" x2="49333" y2="8889"/>
+                          <a14:foregroundMark x1="48000" y1="2222" x2="53778" y2="3111"/>
+                          <a14:foregroundMark x1="6222" y1="76889" x2="10222" y2="93333"/>
+                          <a14:foregroundMark x1="10222" y1="93333" x2="13778" y2="97333"/>
+                          <a14:foregroundMark x1="4444" y1="78222" x2="4889" y2="80000"/>
+                          <a14:foregroundMark x1="74222" y1="68889" x2="81333" y2="84889"/>
+                          <a14:foregroundMark x1="81333" y1="84889" x2="43111" y2="88889"/>
+                          <a14:foregroundMark x1="28889" y1="86667" x2="58222" y2="88889"/>
+                          <a14:foregroundMark x1="58222" y1="88889" x2="75111" y2="87556"/>
+                          <a14:foregroundMark x1="75111" y1="87556" x2="75111" y2="87556"/>
+                          <a14:foregroundMark x1="25333" y1="88000" x2="58222" y2="95111"/>
+                          <a14:foregroundMark x1="58222" y1="95111" x2="66222" y2="93778"/>
+                          <a14:foregroundMark x1="19556" y1="92889" x2="47556" y2="93778"/>
+                          <a14:foregroundMark x1="47556" y1="93778" x2="71556" y2="90667"/>
+                          <a14:foregroundMark x1="71556" y1="90667" x2="73333" y2="89333"/>
+                          <a14:foregroundMark x1="93778" y1="78667" x2="92000" y2="80889"/>
+                        </a14:backgroundRemoval>
+                      </a14:imgEffect>
+                    </a14:imgLayer>
+                  </a14:imgProps>
+                </a:ext>
+                <a:ext uri="{28A0092B-C50C-407E-A947-70E740481C1C}">
+                  <a14:useLocalDpi xmlns:a14="http://schemas.microsoft.com/office/drawing/2010/main" val="0"/>
+                </a:ext>
+              </a:extLst>
+            </a:blip>
+            <a:srcRect/>
+            <a:stretch>
+              <a:fillRect/>
+            </a:stretch>
+          </p:blipFill>
+          <p:spPr bwMode="auto">
+            <a:xfrm>
+              <a:off x="3627237" y="2135301"/>
+              <a:ext cx="481282" cy="481282"/>
+            </a:xfrm>
+            <a:prstGeom prst="rect">
+              <a:avLst/>
+            </a:prstGeom>
+            <a:noFill/>
+            <a:extLst>
+              <a:ext uri="{909E8E84-426E-40DD-AFC4-6F175D3DCCD1}">
+                <a14:hiddenFill xmlns:a14="http://schemas.microsoft.com/office/drawing/2010/main">
+                  <a:solidFill>
+                    <a:srgbClr val="FFFFFF"/>
+                  </a:solidFill>
+                </a14:hiddenFill>
+              </a:ext>
+            </a:extLst>
+          </p:spPr>
+        </p:pic>
+        <p:pic>
+          <p:nvPicPr>
+            <p:cNvPr id="1050" name="Picture 26" descr="Data Services - SQL Database (US Gov AZ) / Prem PRS6 DB Days | TW Micronics">
+              <a:extLst>
+                <a:ext uri="{FF2B5EF4-FFF2-40B4-BE49-F238E27FC236}">
+                  <a16:creationId xmlns:a16="http://schemas.microsoft.com/office/drawing/2014/main" id="{C9DD1320-CCE1-1342-BCEB-6BE2F15FB75F}"/>
+                </a:ext>
+              </a:extLst>
+            </p:cNvPr>
+            <p:cNvPicPr>
+              <a:picLocks noChangeAspect="1" noChangeArrowheads="1"/>
+            </p:cNvPicPr>
+            <p:nvPr/>
+          </p:nvPicPr>
+          <p:blipFill rotWithShape="1">
+            <a:blip r:embed="rId17">
+              <a:extLst>
+                <a:ext uri="{BEBA8EAE-BF5A-486C-A8C5-ECC9F3942E4B}">
+                  <a14:imgProps xmlns:a14="http://schemas.microsoft.com/office/drawing/2010/main">
+                    <a14:imgLayer r:embed="rId18">
+                      <a14:imgEffect>
+                        <a14:backgroundRemoval t="36000" b="64667" l="69167" r="99167">
+                          <a14:foregroundMark x1="69583" y1="45333" x2="69583" y2="58667"/>
+                          <a14:foregroundMark x1="95000" y1="43333" x2="94583" y2="57333"/>
+                          <a14:foregroundMark x1="94583" y1="57333" x2="94167" y2="58667"/>
+                          <a14:foregroundMark x1="97500" y1="44667" x2="97500" y2="55333"/>
+                          <a14:foregroundMark x1="97500" y1="45333" x2="97500" y2="53333"/>
+                          <a14:foregroundMark x1="97500" y1="45333" x2="97917" y2="55333"/>
+                          <a14:foregroundMark x1="98333" y1="46667" x2="98750" y2="56667"/>
+                          <a14:foregroundMark x1="98333" y1="44667" x2="98750" y2="55333"/>
+                          <a14:foregroundMark x1="99167" y1="46000" x2="99167" y2="57333"/>
+                          <a14:foregroundMark x1="72083" y1="54000" x2="71667" y2="53333"/>
+                          <a14:foregroundMark x1="71250" y1="52667" x2="71250" y2="56000"/>
+                        </a14:backgroundRemoval>
+                      </a14:imgEffect>
+                    </a14:imgLayer>
+                  </a14:imgProps>
+                </a:ext>
+                <a:ext uri="{28A0092B-C50C-407E-A947-70E740481C1C}">
+                  <a14:useLocalDpi xmlns:a14="http://schemas.microsoft.com/office/drawing/2010/main" val="0"/>
+                </a:ext>
+              </a:extLst>
+            </a:blip>
+            <a:srcRect l="66254" t="32470" b="31357"/>
+            <a:stretch/>
+          </p:blipFill>
+          <p:spPr bwMode="auto">
+            <a:xfrm>
+              <a:off x="3849422" y="2410401"/>
+              <a:ext cx="440080" cy="294825"/>
+            </a:xfrm>
+            <a:prstGeom prst="rect">
+              <a:avLst/>
+            </a:prstGeom>
+            <a:noFill/>
+            <a:extLst>
+              <a:ext uri="{909E8E84-426E-40DD-AFC4-6F175D3DCCD1}">
+                <a14:hiddenFill xmlns:a14="http://schemas.microsoft.com/office/drawing/2010/main">
+                  <a:solidFill>
+                    <a:srgbClr val="FFFFFF"/>
+                  </a:solidFill>
+                </a14:hiddenFill>
+              </a:ext>
+            </a:extLst>
+          </p:spPr>
+        </p:pic>
+      </p:grpSp>
+      <p:pic>
+        <p:nvPicPr>
+          <p:cNvPr id="1054" name="Picture 30" descr="machine learning automation tools Promotions">
+            <a:extLst>
+              <a:ext uri="{FF2B5EF4-FFF2-40B4-BE49-F238E27FC236}">
+                <a16:creationId xmlns:a16="http://schemas.microsoft.com/office/drawing/2014/main" id="{DBEC00C7-E6B3-BC40-B135-FE0BF0E96E65}"/>
+              </a:ext>
+            </a:extLst>
+          </p:cNvPr>
+          <p:cNvPicPr>
+            <a:picLocks noChangeAspect="1" noChangeArrowheads="1"/>
+          </p:cNvPicPr>
+          <p:nvPr/>
+        </p:nvPicPr>
+        <p:blipFill rotWithShape="1">
+          <a:blip r:embed="rId19">
+            <a:extLst>
+              <a:ext uri="{BEBA8EAE-BF5A-486C-A8C5-ECC9F3942E4B}">
+                <a14:imgProps xmlns:a14="http://schemas.microsoft.com/office/drawing/2010/main">
+                  <a14:imgLayer r:embed="rId20">
+                    <a14:imgEffect>
+                      <a14:backgroundRemoval t="31915" b="61277" l="52239" r="71642">
+                        <a14:foregroundMark x1="51173" y1="56596" x2="56716" y2="61277"/>
+                        <a14:foregroundMark x1="56716" y1="61277" x2="62900" y2="60851"/>
+                        <a14:foregroundMark x1="70362" y1="56170" x2="71642" y2="59149"/>
+                        <a14:foregroundMark x1="71429" y1="56170" x2="71215" y2="58298"/>
+                        <a14:foregroundMark x1="69723" y1="38298" x2="69723" y2="38298"/>
+                        <a14:foregroundMark x1="68017" y1="36596" x2="68017" y2="36596"/>
+                      </a14:backgroundRemoval>
+                    </a14:imgEffect>
+                  </a14:imgLayer>
+                </a14:imgProps>
+              </a:ext>
+              <a:ext uri="{28A0092B-C50C-407E-A947-70E740481C1C}">
+                <a14:useLocalDpi xmlns:a14="http://schemas.microsoft.com/office/drawing/2010/main" val="0"/>
+              </a:ext>
+            </a:extLst>
+          </a:blip>
+          <a:srcRect l="50000" t="29222" r="26898" b="35568"/>
+          <a:stretch/>
+        </p:blipFill>
+        <p:spPr bwMode="auto">
+          <a:xfrm>
+            <a:off x="4871512" y="1412821"/>
+            <a:ext cx="724205" cy="553061"/>
+          </a:xfrm>
+          <a:prstGeom prst="rect">
+            <a:avLst/>
+          </a:prstGeom>
+          <a:noFill/>
+          <a:extLst>
+            <a:ext uri="{909E8E84-426E-40DD-AFC4-6F175D3DCCD1}">
+              <a14:hiddenFill xmlns:a14="http://schemas.microsoft.com/office/drawing/2010/main">
+                <a:solidFill>
+                  <a:srgbClr val="FFFFFF"/>
+                </a:solidFill>
+              </a14:hiddenFill>
+            </a:ext>
+          </a:extLst>
+        </p:spPr>
+      </p:pic>
+      <p:pic>
+        <p:nvPicPr>
+          <p:cNvPr id="1058" name="Picture 34" descr="Azure DevOps Multi-Stage Pipelines: Require Stage Approval">
+            <a:extLst>
+              <a:ext uri="{FF2B5EF4-FFF2-40B4-BE49-F238E27FC236}">
+                <a16:creationId xmlns:a16="http://schemas.microsoft.com/office/drawing/2014/main" id="{5700FC6F-2C5F-3D4B-B0A6-CBCE2BA7BDF4}"/>
+              </a:ext>
+            </a:extLst>
+          </p:cNvPr>
+          <p:cNvPicPr>
+            <a:picLocks noChangeAspect="1" noChangeArrowheads="1"/>
+          </p:cNvPicPr>
+          <p:nvPr/>
+        </p:nvPicPr>
+        <p:blipFill>
+          <a:blip r:embed="rId21">
+            <a:extLst>
+              <a:ext uri="{BEBA8EAE-BF5A-486C-A8C5-ECC9F3942E4B}">
+                <a14:imgProps xmlns:a14="http://schemas.microsoft.com/office/drawing/2010/main">
+                  <a14:imgLayer r:embed="rId22">
+                    <a14:imgEffect>
+                      <a14:backgroundRemoval t="10000" b="90000" l="10000" r="90000">
+                        <a14:foregroundMark x1="10667" y1="75333" x2="17667" y2="87667"/>
+                        <a14:foregroundMark x1="17667" y1="87667" x2="26667" y2="88333"/>
+                        <a14:foregroundMark x1="28333" y1="70667" x2="28333" y2="70667"/>
+                      </a14:backgroundRemoval>
+                    </a14:imgEffect>
+                  </a14:imgLayer>
+                </a14:imgProps>
+              </a:ext>
+              <a:ext uri="{28A0092B-C50C-407E-A947-70E740481C1C}">
+                <a14:useLocalDpi xmlns:a14="http://schemas.microsoft.com/office/drawing/2010/main" val="0"/>
+              </a:ext>
+            </a:extLst>
+          </a:blip>
+          <a:srcRect/>
+          <a:stretch>
+            <a:fillRect/>
+          </a:stretch>
+        </p:blipFill>
+        <p:spPr bwMode="auto">
+          <a:xfrm>
+            <a:off x="6984788" y="2504088"/>
+            <a:ext cx="534495" cy="534495"/>
+          </a:xfrm>
+          <a:prstGeom prst="rect">
+            <a:avLst/>
+          </a:prstGeom>
+          <a:noFill/>
+          <a:extLst>
+            <a:ext uri="{909E8E84-426E-40DD-AFC4-6F175D3DCCD1}">
+              <a14:hiddenFill xmlns:a14="http://schemas.microsoft.com/office/drawing/2010/main">
+                <a:solidFill>
+                  <a:srgbClr val="FFFFFF"/>
+                </a:solidFill>
+              </a14:hiddenFill>
+            </a:ext>
+          </a:extLst>
+        </p:spPr>
+      </p:pic>
+      <p:pic>
+        <p:nvPicPr>
+          <p:cNvPr id="1060" name="Picture 36" descr="GitHub - microsoft/LightGBM: A fast, distributed, high performance gradient  boosting (GBT, GBDT, GBRT, GBM or MART) framework based on decision tree  algorithms, used for ranking, classification and many other machine  learning tasks.">
+            <a:extLst>
+              <a:ext uri="{FF2B5EF4-FFF2-40B4-BE49-F238E27FC236}">
+                <a16:creationId xmlns:a16="http://schemas.microsoft.com/office/drawing/2014/main" id="{421D8C6E-AE04-B344-A4DB-DAED6DD01993}"/>
+              </a:ext>
+            </a:extLst>
+          </p:cNvPr>
+          <p:cNvPicPr>
+            <a:picLocks noChangeAspect="1" noChangeArrowheads="1"/>
+          </p:cNvPicPr>
+          <p:nvPr/>
+        </p:nvPicPr>
+        <p:blipFill>
+          <a:blip r:embed="rId23">
+            <a:extLst>
+              <a:ext uri="{28A0092B-C50C-407E-A947-70E740481C1C}">
+                <a14:useLocalDpi xmlns:a14="http://schemas.microsoft.com/office/drawing/2010/main" val="0"/>
+              </a:ext>
+            </a:extLst>
+          </a:blip>
+          <a:srcRect/>
+          <a:stretch>
+            <a:fillRect/>
+          </a:stretch>
+        </p:blipFill>
+        <p:spPr bwMode="auto">
+          <a:xfrm>
+            <a:off x="4789242" y="3639881"/>
+            <a:ext cx="1001012" cy="500506"/>
+          </a:xfrm>
+          <a:prstGeom prst="rect">
+            <a:avLst/>
+          </a:prstGeom>
+          <a:noFill/>
+          <a:extLst>
+            <a:ext uri="{909E8E84-426E-40DD-AFC4-6F175D3DCCD1}">
+              <a14:hiddenFill xmlns:a14="http://schemas.microsoft.com/office/drawing/2010/main">
+                <a:solidFill>
+                  <a:srgbClr val="FFFFFF"/>
+                </a:solidFill>
+              </a14:hiddenFill>
+            </a:ext>
+          </a:extLst>
+        </p:spPr>
+      </p:pic>
+      <p:pic>
+        <p:nvPicPr>
+          <p:cNvPr id="1062" name="Picture 38" descr="Data Center Fabric - Extreme Networks">
+            <a:extLst>
+              <a:ext uri="{FF2B5EF4-FFF2-40B4-BE49-F238E27FC236}">
+                <a16:creationId xmlns:a16="http://schemas.microsoft.com/office/drawing/2014/main" id="{4B765120-ADD1-6643-AF81-F7ADCB7E29ED}"/>
+              </a:ext>
+            </a:extLst>
+          </p:cNvPr>
+          <p:cNvPicPr>
+            <a:picLocks noChangeAspect="1" noChangeArrowheads="1"/>
+          </p:cNvPicPr>
+          <p:nvPr/>
+        </p:nvPicPr>
+        <p:blipFill>
+          <a:blip r:embed="rId24">
+            <a:extLst>
+              <a:ext uri="{BEBA8EAE-BF5A-486C-A8C5-ECC9F3942E4B}">
+                <a14:imgProps xmlns:a14="http://schemas.microsoft.com/office/drawing/2010/main">
+                  <a14:imgLayer r:embed="rId25">
+                    <a14:imgEffect>
+                      <a14:backgroundRemoval t="7556" b="93778" l="1778" r="96889">
+                        <a14:foregroundMark x1="44444" y1="44000" x2="44444" y2="44000"/>
+                        <a14:foregroundMark x1="14222" y1="21333" x2="14222" y2="21333"/>
+                        <a14:foregroundMark x1="37778" y1="8444" x2="54667" y2="7556"/>
+                        <a14:foregroundMark x1="54667" y1="7556" x2="56444" y2="7556"/>
+                        <a14:foregroundMark x1="92000" y1="33333" x2="93333" y2="31111"/>
+                        <a14:foregroundMark x1="93333" y1="28444" x2="96889" y2="25333"/>
+                        <a14:foregroundMark x1="8444" y1="65778" x2="19111" y2="81333"/>
+                        <a14:foregroundMark x1="89778" y1="69333" x2="74222" y2="84889"/>
+                        <a14:foregroundMark x1="64889" y1="91111" x2="48444" y2="93778"/>
+                        <a14:foregroundMark x1="48444" y1="93778" x2="35556" y2="91111"/>
+                        <a14:foregroundMark x1="5333" y1="68000" x2="1778" y2="74667"/>
+                      </a14:backgroundRemoval>
+                    </a14:imgEffect>
+                  </a14:imgLayer>
+                </a14:imgProps>
+              </a:ext>
+              <a:ext uri="{28A0092B-C50C-407E-A947-70E740481C1C}">
+                <a14:useLocalDpi xmlns:a14="http://schemas.microsoft.com/office/drawing/2010/main" val="0"/>
+              </a:ext>
+            </a:extLst>
+          </a:blip>
+          <a:srcRect/>
+          <a:stretch>
+            <a:fillRect/>
+          </a:stretch>
+        </p:blipFill>
+        <p:spPr bwMode="auto">
+          <a:xfrm>
+            <a:off x="5086668" y="4359480"/>
+            <a:ext cx="406159" cy="406159"/>
+          </a:xfrm>
+          <a:prstGeom prst="rect">
+            <a:avLst/>
+          </a:prstGeom>
+          <a:noFill/>
+          <a:extLst>
+            <a:ext uri="{909E8E84-426E-40DD-AFC4-6F175D3DCCD1}">
+              <a14:hiddenFill xmlns:a14="http://schemas.microsoft.com/office/drawing/2010/main">
+                <a:solidFill>
+                  <a:srgbClr val="FFFFFF"/>
+                </a:solidFill>
+              </a14:hiddenFill>
+            </a:ext>
+          </a:extLst>
+        </p:spPr>
+      </p:pic>
+      <p:sp>
+        <p:nvSpPr>
+          <p:cNvPr id="28" name="TextBox 27">
+            <a:extLst>
+              <a:ext uri="{FF2B5EF4-FFF2-40B4-BE49-F238E27FC236}">
+                <a16:creationId xmlns:a16="http://schemas.microsoft.com/office/drawing/2014/main" id="{40565E01-32BF-6F4F-BBE0-1CFC05936F7B}"/>
+              </a:ext>
+            </a:extLst>
+          </p:cNvPr>
+          <p:cNvSpPr txBox="1"/>
+          <p:nvPr/>
+        </p:nvSpPr>
+        <p:spPr>
+          <a:xfrm>
+            <a:off x="4378708" y="3993795"/>
+            <a:ext cx="1956613" cy="261610"/>
+          </a:xfrm>
+          <a:prstGeom prst="rect">
+            <a:avLst/>
+          </a:prstGeom>
+          <a:noFill/>
+        </p:spPr>
+        <p:txBody>
+          <a:bodyPr wrap="square" rtlCol="0">
+            <a:spAutoFit/>
+          </a:bodyPr>
+          <a:lstStyle/>
+          <a:p>
+            <a:r>
+              <a:rPr lang="en-US" sz="1100" dirty="0"/>
+              <a:t>Light-Gradient Boosting Model</a:t>
+            </a:r>
+            <a:endParaRPr lang="en-TH" sz="1100" dirty="0"/>
+          </a:p>
+        </p:txBody>
+      </p:sp>
+      <p:sp>
+        <p:nvSpPr>
+          <p:cNvPr id="52" name="TextBox 51">
+            <a:extLst>
+              <a:ext uri="{FF2B5EF4-FFF2-40B4-BE49-F238E27FC236}">
+                <a16:creationId xmlns:a16="http://schemas.microsoft.com/office/drawing/2014/main" id="{C8DAF119-2A43-D24E-8BB8-149796EFAEE2}"/>
+              </a:ext>
+            </a:extLst>
+          </p:cNvPr>
+          <p:cNvSpPr txBox="1"/>
+          <p:nvPr/>
+        </p:nvSpPr>
+        <p:spPr>
+          <a:xfrm>
+            <a:off x="4361134" y="4724286"/>
+            <a:ext cx="1776979" cy="430887"/>
+          </a:xfrm>
+          <a:prstGeom prst="rect">
+            <a:avLst/>
+          </a:prstGeom>
+          <a:noFill/>
+        </p:spPr>
+        <p:txBody>
+          <a:bodyPr wrap="square" rtlCol="0">
+            <a:spAutoFit/>
+          </a:bodyPr>
+          <a:lstStyle/>
+          <a:p>
+            <a:pPr algn="ctr"/>
+            <a:r>
+              <a:rPr lang="en-US" sz="1100" dirty="0"/>
+              <a:t>Hyperdrive</a:t>
+            </a:r>
+            <a:br>
+              <a:rPr lang="en-US" sz="1100" dirty="0"/>
+            </a:br>
+            <a:r>
+              <a:rPr lang="en-US" sz="1100" dirty="0"/>
+              <a:t>(Hyperparameter – Tuning)</a:t>
+            </a:r>
+            <a:endParaRPr lang="en-TH" sz="1100" dirty="0"/>
+          </a:p>
+        </p:txBody>
+      </p:sp>
+      <p:sp>
+        <p:nvSpPr>
+          <p:cNvPr id="54" name="TextBox 53">
+            <a:extLst>
+              <a:ext uri="{FF2B5EF4-FFF2-40B4-BE49-F238E27FC236}">
+                <a16:creationId xmlns:a16="http://schemas.microsoft.com/office/drawing/2014/main" id="{DD53095F-A84C-C545-A1AB-9B1295B8D25B}"/>
+              </a:ext>
+            </a:extLst>
+          </p:cNvPr>
+          <p:cNvSpPr txBox="1"/>
+          <p:nvPr/>
+        </p:nvSpPr>
+        <p:spPr>
+          <a:xfrm>
+            <a:off x="4895012" y="1970324"/>
+            <a:ext cx="724205" cy="261610"/>
+          </a:xfrm>
+          <a:prstGeom prst="rect">
+            <a:avLst/>
+          </a:prstGeom>
+          <a:noFill/>
+        </p:spPr>
+        <p:txBody>
+          <a:bodyPr wrap="square" rtlCol="0">
+            <a:spAutoFit/>
+          </a:bodyPr>
+          <a:lstStyle/>
+          <a:p>
+            <a:r>
+              <a:rPr lang="en-US" sz="1100" dirty="0" err="1"/>
+              <a:t>AutoML</a:t>
+            </a:r>
+            <a:endParaRPr lang="en-TH" sz="1100" dirty="0"/>
+          </a:p>
+        </p:txBody>
+      </p:sp>
+      <p:grpSp>
+        <p:nvGrpSpPr>
+          <p:cNvPr id="43" name="Group 42">
+            <a:extLst>
+              <a:ext uri="{FF2B5EF4-FFF2-40B4-BE49-F238E27FC236}">
+                <a16:creationId xmlns:a16="http://schemas.microsoft.com/office/drawing/2014/main" id="{9A6044D7-5932-F642-9387-9CAE2BD354C9}"/>
+              </a:ext>
+            </a:extLst>
+          </p:cNvPr>
+          <p:cNvGrpSpPr/>
+          <p:nvPr/>
+        </p:nvGrpSpPr>
+        <p:grpSpPr>
+          <a:xfrm>
+            <a:off x="5598385" y="1229042"/>
+            <a:ext cx="421217" cy="352147"/>
+            <a:chOff x="5949236" y="1132976"/>
+            <a:chExt cx="421217" cy="352147"/>
+          </a:xfrm>
+        </p:grpSpPr>
+        <p:pic>
+          <p:nvPicPr>
+            <p:cNvPr id="49" name="Picture 28" descr="Azureml Tensorflow 2.4 Inference GPU Image by Microsoft | Docker Hub">
+              <a:extLst>
+                <a:ext uri="{FF2B5EF4-FFF2-40B4-BE49-F238E27FC236}">
+                  <a16:creationId xmlns:a16="http://schemas.microsoft.com/office/drawing/2014/main" id="{FA393D8E-A440-F341-B080-3AECBBD62541}"/>
+                </a:ext>
+              </a:extLst>
+            </p:cNvPr>
+            <p:cNvPicPr>
+              <a:picLocks noChangeAspect="1" noChangeArrowheads="1"/>
+            </p:cNvPicPr>
+            <p:nvPr/>
+          </p:nvPicPr>
+          <p:blipFill>
+            <a:blip r:embed="rId15">
+              <a:extLst>
+                <a:ext uri="{BEBA8EAE-BF5A-486C-A8C5-ECC9F3942E4B}">
+                  <a14:imgProps xmlns:a14="http://schemas.microsoft.com/office/drawing/2010/main">
+                    <a14:imgLayer r:embed="rId26">
+                      <a14:imgEffect>
+                        <a14:backgroundRemoval t="1778" b="96889" l="4000" r="93778">
+                          <a14:foregroundMark x1="56444" y1="6667" x2="49333" y2="8889"/>
+                          <a14:foregroundMark x1="48000" y1="2222" x2="53778" y2="3111"/>
+                          <a14:foregroundMark x1="6222" y1="76889" x2="10222" y2="93333"/>
+                          <a14:foregroundMark x1="10222" y1="93333" x2="13778" y2="97333"/>
+                          <a14:foregroundMark x1="4444" y1="78222" x2="4889" y2="80000"/>
+                          <a14:foregroundMark x1="74222" y1="68889" x2="81333" y2="84889"/>
+                          <a14:foregroundMark x1="81333" y1="84889" x2="43111" y2="88889"/>
+                          <a14:foregroundMark x1="28889" y1="86667" x2="58222" y2="88889"/>
+                          <a14:foregroundMark x1="58222" y1="88889" x2="75111" y2="87556"/>
+                          <a14:foregroundMark x1="75111" y1="87556" x2="75111" y2="87556"/>
+                          <a14:foregroundMark x1="25333" y1="88000" x2="58222" y2="95111"/>
+                          <a14:foregroundMark x1="58222" y1="95111" x2="66222" y2="93778"/>
+                          <a14:foregroundMark x1="19556" y1="92889" x2="47556" y2="93778"/>
+                          <a14:foregroundMark x1="47556" y1="93778" x2="71556" y2="90667"/>
+                          <a14:foregroundMark x1="71556" y1="90667" x2="73333" y2="89333"/>
+                          <a14:foregroundMark x1="93778" y1="78667" x2="92000" y2="80889"/>
+                        </a14:backgroundRemoval>
+                      </a14:imgEffect>
+                    </a14:imgLayer>
+                  </a14:imgProps>
+                </a:ext>
+                <a:ext uri="{28A0092B-C50C-407E-A947-70E740481C1C}">
+                  <a14:useLocalDpi xmlns:a14="http://schemas.microsoft.com/office/drawing/2010/main" val="0"/>
+                </a:ext>
+              </a:extLst>
+            </a:blip>
+            <a:srcRect/>
+            <a:stretch>
+              <a:fillRect/>
+            </a:stretch>
+          </p:blipFill>
+          <p:spPr bwMode="auto">
+            <a:xfrm>
+              <a:off x="5949236" y="1164411"/>
+              <a:ext cx="320712" cy="320712"/>
+            </a:xfrm>
+            <a:prstGeom prst="rect">
+              <a:avLst/>
+            </a:prstGeom>
+            <a:noFill/>
+            <a:extLst>
+              <a:ext uri="{909E8E84-426E-40DD-AFC4-6F175D3DCCD1}">
+                <a14:hiddenFill xmlns:a14="http://schemas.microsoft.com/office/drawing/2010/main">
+                  <a:solidFill>
+                    <a:srgbClr val="FFFFFF"/>
+                  </a:solidFill>
+                </a14:hiddenFill>
+              </a:ext>
+            </a:extLst>
+          </p:spPr>
+        </p:pic>
+        <p:pic>
+          <p:nvPicPr>
+            <p:cNvPr id="1066" name="Picture 42" descr="Azure Icon #165842 - Free Icons Library">
+              <a:extLst>
+                <a:ext uri="{FF2B5EF4-FFF2-40B4-BE49-F238E27FC236}">
+                  <a16:creationId xmlns:a16="http://schemas.microsoft.com/office/drawing/2014/main" id="{D064E86D-49B7-7D43-B5CF-E2199FC572E3}"/>
+                </a:ext>
+              </a:extLst>
+            </p:cNvPr>
+            <p:cNvPicPr>
+              <a:picLocks noChangeAspect="1" noChangeArrowheads="1"/>
+            </p:cNvPicPr>
+            <p:nvPr/>
+          </p:nvPicPr>
+          <p:blipFill>
+            <a:blip r:embed="rId27">
+              <a:extLst>
+                <a:ext uri="{28A0092B-C50C-407E-A947-70E740481C1C}">
+                  <a14:useLocalDpi xmlns:a14="http://schemas.microsoft.com/office/drawing/2010/main" val="0"/>
+                </a:ext>
+              </a:extLst>
+            </a:blip>
+            <a:srcRect/>
+            <a:stretch>
+              <a:fillRect/>
+            </a:stretch>
+          </p:blipFill>
+          <p:spPr bwMode="auto">
+            <a:xfrm>
+              <a:off x="6118303" y="1132976"/>
+              <a:ext cx="252150" cy="252150"/>
+            </a:xfrm>
+            <a:prstGeom prst="rect">
+              <a:avLst/>
+            </a:prstGeom>
+            <a:noFill/>
+            <a:extLst>
+              <a:ext uri="{909E8E84-426E-40DD-AFC4-6F175D3DCCD1}">
+                <a14:hiddenFill xmlns:a14="http://schemas.microsoft.com/office/drawing/2010/main">
+                  <a:solidFill>
+                    <a:srgbClr val="FFFFFF"/>
+                  </a:solidFill>
+                </a14:hiddenFill>
+              </a:ext>
+            </a:extLst>
+          </p:spPr>
+        </p:pic>
+      </p:grpSp>
+      <p:sp>
+        <p:nvSpPr>
+          <p:cNvPr id="63" name="TextBox 62">
+            <a:extLst>
+              <a:ext uri="{FF2B5EF4-FFF2-40B4-BE49-F238E27FC236}">
+                <a16:creationId xmlns:a16="http://schemas.microsoft.com/office/drawing/2014/main" id="{AF690CA7-7C44-F14B-965B-A3EE7D97CB72}"/>
+              </a:ext>
+            </a:extLst>
+          </p:cNvPr>
+          <p:cNvSpPr txBox="1"/>
+          <p:nvPr/>
+        </p:nvSpPr>
+        <p:spPr>
+          <a:xfrm>
+            <a:off x="535317" y="5868978"/>
+            <a:ext cx="805774" cy="261610"/>
+          </a:xfrm>
+          <a:prstGeom prst="rect">
+            <a:avLst/>
+          </a:prstGeom>
+          <a:noFill/>
+        </p:spPr>
+        <p:txBody>
+          <a:bodyPr wrap="square" rtlCol="0">
+            <a:spAutoFit/>
+          </a:bodyPr>
+          <a:lstStyle/>
+          <a:p>
+            <a:pPr algn="ctr"/>
+            <a:r>
+              <a:rPr lang="en-US" sz="1100" dirty="0"/>
+              <a:t>IoT Device</a:t>
+            </a:r>
+            <a:endParaRPr lang="en-TH" sz="1100" dirty="0"/>
+          </a:p>
+        </p:txBody>
+      </p:sp>
+      <p:sp>
+        <p:nvSpPr>
+          <p:cNvPr id="65" name="TextBox 64">
+            <a:extLst>
+              <a:ext uri="{FF2B5EF4-FFF2-40B4-BE49-F238E27FC236}">
+                <a16:creationId xmlns:a16="http://schemas.microsoft.com/office/drawing/2014/main" id="{6756F3EE-09C2-C44B-8592-5C6012781CD6}"/>
+              </a:ext>
+            </a:extLst>
+          </p:cNvPr>
+          <p:cNvSpPr txBox="1"/>
+          <p:nvPr/>
+        </p:nvSpPr>
+        <p:spPr>
+          <a:xfrm>
+            <a:off x="1488024" y="5940213"/>
+            <a:ext cx="688629" cy="261610"/>
+          </a:xfrm>
+          <a:prstGeom prst="rect">
+            <a:avLst/>
+          </a:prstGeom>
+          <a:noFill/>
+        </p:spPr>
+        <p:txBody>
+          <a:bodyPr wrap="square" rtlCol="0">
+            <a:spAutoFit/>
+          </a:bodyPr>
+          <a:lstStyle/>
+          <a:p>
+            <a:r>
+              <a:rPr lang="en-US" sz="1100" dirty="0"/>
+              <a:t>IoT Edge</a:t>
+            </a:r>
+            <a:endParaRPr lang="en-TH" sz="1100" dirty="0"/>
+          </a:p>
+        </p:txBody>
+      </p:sp>
+      <p:sp>
+        <p:nvSpPr>
+          <p:cNvPr id="66" name="TextBox 65">
+            <a:extLst>
+              <a:ext uri="{FF2B5EF4-FFF2-40B4-BE49-F238E27FC236}">
+                <a16:creationId xmlns:a16="http://schemas.microsoft.com/office/drawing/2014/main" id="{CE2ACA18-B748-954C-8F24-58130CCD1D3D}"/>
+              </a:ext>
+            </a:extLst>
+          </p:cNvPr>
+          <p:cNvSpPr txBox="1"/>
+          <p:nvPr/>
+        </p:nvSpPr>
+        <p:spPr>
+          <a:xfrm>
+            <a:off x="1603792" y="5044599"/>
+            <a:ext cx="742523" cy="261610"/>
+          </a:xfrm>
+          <a:prstGeom prst="rect">
+            <a:avLst/>
+          </a:prstGeom>
+          <a:noFill/>
+        </p:spPr>
+        <p:txBody>
+          <a:bodyPr wrap="square" rtlCol="0">
+            <a:spAutoFit/>
+          </a:bodyPr>
+          <a:lstStyle/>
+          <a:p>
+            <a:r>
+              <a:rPr lang="en-US" sz="1100" dirty="0"/>
+              <a:t>IoT Hub</a:t>
+            </a:r>
+            <a:endParaRPr lang="en-TH" sz="1100" dirty="0"/>
+          </a:p>
+        </p:txBody>
+      </p:sp>
+      <p:cxnSp>
+        <p:nvCxnSpPr>
+          <p:cNvPr id="32" name="Elbow Connector 31">
+            <a:extLst>
+              <a:ext uri="{FF2B5EF4-FFF2-40B4-BE49-F238E27FC236}">
+                <a16:creationId xmlns:a16="http://schemas.microsoft.com/office/drawing/2014/main" id="{86673AB6-81A2-704C-8C08-791CAED0AC48}"/>
+              </a:ext>
+            </a:extLst>
+          </p:cNvPr>
+          <p:cNvCxnSpPr>
+            <a:cxnSpLocks/>
+            <a:stCxn id="35" idx="3"/>
+            <a:endCxn id="1036" idx="1"/>
+          </p:cNvCxnSpPr>
+          <p:nvPr/>
+        </p:nvCxnSpPr>
+        <p:spPr>
+          <a:xfrm>
+            <a:off x="1279325" y="5601570"/>
+            <a:ext cx="388709" cy="132354"/>
+          </a:xfrm>
+          <a:prstGeom prst="bentConnector3">
+            <a:avLst/>
+          </a:prstGeom>
+          <a:ln>
+            <a:tailEnd type="triangle"/>
+          </a:ln>
+        </p:spPr>
+        <p:style>
+          <a:lnRef idx="1">
+            <a:schemeClr val="dk1"/>
+          </a:lnRef>
+          <a:fillRef idx="0">
+            <a:schemeClr val="dk1"/>
+          </a:fillRef>
+          <a:effectRef idx="0">
+            <a:schemeClr val="dk1"/>
+          </a:effectRef>
+          <a:fontRef idx="minor">
+            <a:schemeClr val="tx1"/>
+          </a:fontRef>
+        </p:style>
+      </p:cxnSp>
+      <p:cxnSp>
+        <p:nvCxnSpPr>
+          <p:cNvPr id="39" name="Elbow Connector 38">
+            <a:extLst>
+              <a:ext uri="{FF2B5EF4-FFF2-40B4-BE49-F238E27FC236}">
+                <a16:creationId xmlns:a16="http://schemas.microsoft.com/office/drawing/2014/main" id="{EB2E9DEB-7CCE-374B-8EA2-06A2C5819D2F}"/>
+              </a:ext>
+            </a:extLst>
+          </p:cNvPr>
+          <p:cNvCxnSpPr>
+            <a:stCxn id="25" idx="0"/>
+            <a:endCxn id="11" idx="1"/>
+          </p:cNvCxnSpPr>
+          <p:nvPr/>
+        </p:nvCxnSpPr>
+        <p:spPr>
+          <a:xfrm rot="5400000" flipH="1" flipV="1">
+            <a:off x="1110612" y="4518333"/>
+            <a:ext cx="240833" cy="905429"/>
+          </a:xfrm>
+          <a:prstGeom prst="bentConnector2">
+            <a:avLst/>
+          </a:prstGeom>
+          <a:ln>
+            <a:tailEnd type="triangle"/>
+          </a:ln>
+        </p:spPr>
+        <p:style>
+          <a:lnRef idx="1">
+            <a:schemeClr val="dk1"/>
+          </a:lnRef>
+          <a:fillRef idx="0">
+            <a:schemeClr val="dk1"/>
+          </a:fillRef>
+          <a:effectRef idx="0">
+            <a:schemeClr val="dk1"/>
+          </a:effectRef>
+          <a:fontRef idx="minor">
+            <a:schemeClr val="tx1"/>
+          </a:fontRef>
+        </p:style>
+      </p:cxnSp>
+      <p:cxnSp>
+        <p:nvCxnSpPr>
+          <p:cNvPr id="41" name="Straight Arrow Connector 40">
+            <a:extLst>
+              <a:ext uri="{FF2B5EF4-FFF2-40B4-BE49-F238E27FC236}">
+                <a16:creationId xmlns:a16="http://schemas.microsoft.com/office/drawing/2014/main" id="{6D43556F-9309-AF41-8D7C-700FE4D99133}"/>
+              </a:ext>
+            </a:extLst>
+          </p:cNvPr>
+          <p:cNvCxnSpPr>
+            <a:cxnSpLocks/>
+            <a:stCxn id="11" idx="0"/>
+          </p:cNvCxnSpPr>
+          <p:nvPr/>
+        </p:nvCxnSpPr>
+        <p:spPr>
+          <a:xfrm flipV="1">
+            <a:off x="1880489" y="3345674"/>
+            <a:ext cx="0" cy="1308210"/>
+          </a:xfrm>
+          <a:prstGeom prst="straightConnector1">
+            <a:avLst/>
+          </a:prstGeom>
+          <a:ln>
+            <a:tailEnd type="triangle"/>
+          </a:ln>
+        </p:spPr>
+        <p:style>
+          <a:lnRef idx="1">
+            <a:schemeClr val="dk1"/>
+          </a:lnRef>
+          <a:fillRef idx="0">
+            <a:schemeClr val="dk1"/>
+          </a:fillRef>
+          <a:effectRef idx="0">
+            <a:schemeClr val="dk1"/>
+          </a:effectRef>
+          <a:fontRef idx="minor">
+            <a:schemeClr val="tx1"/>
+          </a:fontRef>
+        </p:style>
+      </p:cxnSp>
+      <p:sp>
+        <p:nvSpPr>
+          <p:cNvPr id="74" name="TextBox 73">
+            <a:extLst>
+              <a:ext uri="{FF2B5EF4-FFF2-40B4-BE49-F238E27FC236}">
+                <a16:creationId xmlns:a16="http://schemas.microsoft.com/office/drawing/2014/main" id="{C7474ED3-1129-2049-B1F4-935C6782CC61}"/>
+              </a:ext>
+            </a:extLst>
+          </p:cNvPr>
+          <p:cNvSpPr txBox="1"/>
+          <p:nvPr/>
+        </p:nvSpPr>
+        <p:spPr>
+          <a:xfrm>
+            <a:off x="2006076" y="4518800"/>
+            <a:ext cx="523475" cy="261610"/>
+          </a:xfrm>
+          <a:prstGeom prst="rect">
+            <a:avLst/>
+          </a:prstGeom>
+          <a:noFill/>
+        </p:spPr>
+        <p:txBody>
+          <a:bodyPr wrap="square" rtlCol="0">
+            <a:spAutoFit/>
+          </a:bodyPr>
+          <a:lstStyle/>
+          <a:p>
+            <a:r>
+              <a:rPr lang="en-TH" sz="1100" dirty="0"/>
+              <a:t>*.csv</a:t>
+            </a:r>
+          </a:p>
+        </p:txBody>
+      </p:sp>
+      <p:sp>
+        <p:nvSpPr>
+          <p:cNvPr id="76" name="TextBox 75">
+            <a:extLst>
+              <a:ext uri="{FF2B5EF4-FFF2-40B4-BE49-F238E27FC236}">
+                <a16:creationId xmlns:a16="http://schemas.microsoft.com/office/drawing/2014/main" id="{33B0EC11-E3F0-2B45-8BB7-04D6BF5BB603}"/>
+              </a:ext>
+            </a:extLst>
+          </p:cNvPr>
+          <p:cNvSpPr txBox="1"/>
+          <p:nvPr/>
+        </p:nvSpPr>
+        <p:spPr>
+          <a:xfrm>
+            <a:off x="1389907" y="3144367"/>
+            <a:ext cx="959754" cy="261610"/>
+          </a:xfrm>
+          <a:prstGeom prst="rect">
+            <a:avLst/>
+          </a:prstGeom>
+          <a:noFill/>
+        </p:spPr>
+        <p:txBody>
+          <a:bodyPr wrap="square" rtlCol="0">
+            <a:spAutoFit/>
+          </a:bodyPr>
+          <a:lstStyle/>
+          <a:p>
+            <a:pPr algn="ctr"/>
+            <a:r>
+              <a:rPr lang="en-US" sz="1100" dirty="0"/>
+              <a:t>Blob Storage</a:t>
+            </a:r>
+            <a:endParaRPr lang="en-TH" sz="1100" dirty="0"/>
+          </a:p>
+        </p:txBody>
+      </p:sp>
+      <p:sp>
+        <p:nvSpPr>
+          <p:cNvPr id="77" name="TextBox 76">
+            <a:extLst>
+              <a:ext uri="{FF2B5EF4-FFF2-40B4-BE49-F238E27FC236}">
+                <a16:creationId xmlns:a16="http://schemas.microsoft.com/office/drawing/2014/main" id="{89B32C14-79CA-3640-8546-EBCBCC2AC768}"/>
+              </a:ext>
+            </a:extLst>
+          </p:cNvPr>
+          <p:cNvSpPr txBox="1"/>
+          <p:nvPr/>
+        </p:nvSpPr>
+        <p:spPr>
+          <a:xfrm>
+            <a:off x="3367344" y="3127738"/>
+            <a:ext cx="959754" cy="261610"/>
+          </a:xfrm>
+          <a:prstGeom prst="rect">
+            <a:avLst/>
+          </a:prstGeom>
+          <a:noFill/>
+        </p:spPr>
+        <p:txBody>
+          <a:bodyPr wrap="square" rtlCol="0">
+            <a:spAutoFit/>
+          </a:bodyPr>
+          <a:lstStyle/>
+          <a:p>
+            <a:pPr algn="ctr"/>
+            <a:r>
+              <a:rPr lang="en-US" sz="1100" dirty="0"/>
+              <a:t>Blob Storage</a:t>
+            </a:r>
+            <a:endParaRPr lang="en-TH" sz="1100" dirty="0"/>
+          </a:p>
+        </p:txBody>
+      </p:sp>
+      <p:pic>
+        <p:nvPicPr>
+          <p:cNvPr id="79" name="Picture 14" descr="Azure Storage Tutorial - An Introduction to Azure Storage | Edureka">
+            <a:extLst>
+              <a:ext uri="{FF2B5EF4-FFF2-40B4-BE49-F238E27FC236}">
+                <a16:creationId xmlns:a16="http://schemas.microsoft.com/office/drawing/2014/main" id="{FD9CB804-82D9-E948-82C5-C9B0A4DE52F0}"/>
+              </a:ext>
+            </a:extLst>
+          </p:cNvPr>
+          <p:cNvPicPr>
+            <a:picLocks noChangeAspect="1" noChangeArrowheads="1"/>
+          </p:cNvPicPr>
+          <p:nvPr/>
+        </p:nvPicPr>
+        <p:blipFill>
+          <a:blip r:embed="rId9">
+            <a:extLst>
+              <a:ext uri="{28A0092B-C50C-407E-A947-70E740481C1C}">
+                <a14:useLocalDpi xmlns:a14="http://schemas.microsoft.com/office/drawing/2010/main" val="0"/>
+              </a:ext>
+            </a:extLst>
+          </a:blip>
+          <a:srcRect/>
+          <a:stretch>
+            <a:fillRect/>
+          </a:stretch>
+        </p:blipFill>
+        <p:spPr bwMode="auto">
+          <a:xfrm flipH="1">
+            <a:off x="3588780" y="2696098"/>
+            <a:ext cx="490745" cy="490745"/>
+          </a:xfrm>
+          <a:prstGeom prst="rect">
+            <a:avLst/>
+          </a:prstGeom>
+          <a:noFill/>
+          <a:extLst>
+            <a:ext uri="{909E8E84-426E-40DD-AFC4-6F175D3DCCD1}">
+              <a14:hiddenFill xmlns:a14="http://schemas.microsoft.com/office/drawing/2010/main">
+                <a:solidFill>
+                  <a:srgbClr val="FFFFFF"/>
+                </a:solidFill>
+              </a14:hiddenFill>
+            </a:ext>
+          </a:extLst>
+        </p:spPr>
+      </p:pic>
+      <p:sp>
+        <p:nvSpPr>
+          <p:cNvPr id="80" name="TextBox 79">
+            <a:extLst>
+              <a:ext uri="{FF2B5EF4-FFF2-40B4-BE49-F238E27FC236}">
+                <a16:creationId xmlns:a16="http://schemas.microsoft.com/office/drawing/2014/main" id="{4CCACBBB-155D-7B44-A6EE-1BD48C205CB8}"/>
+              </a:ext>
+            </a:extLst>
+          </p:cNvPr>
+          <p:cNvSpPr txBox="1"/>
+          <p:nvPr/>
+        </p:nvSpPr>
+        <p:spPr>
+          <a:xfrm>
+            <a:off x="2190048" y="3118116"/>
+            <a:ext cx="1398612" cy="261610"/>
+          </a:xfrm>
+          <a:prstGeom prst="rect">
+            <a:avLst/>
+          </a:prstGeom>
+          <a:noFill/>
+        </p:spPr>
+        <p:txBody>
+          <a:bodyPr wrap="square" rtlCol="0">
+            <a:spAutoFit/>
+          </a:bodyPr>
+          <a:lstStyle/>
+          <a:p>
+            <a:pPr algn="ctr"/>
+            <a:r>
+              <a:rPr lang="en-US" sz="1100" dirty="0" err="1"/>
+              <a:t>data_prep.ipynb</a:t>
+            </a:r>
+            <a:endParaRPr lang="en-TH" sz="1100" dirty="0"/>
+          </a:p>
+        </p:txBody>
+      </p:sp>
+      <p:pic>
+        <p:nvPicPr>
+          <p:cNvPr id="81" name="Graphic 80">
+            <a:extLst>
+              <a:ext uri="{FF2B5EF4-FFF2-40B4-BE49-F238E27FC236}">
+                <a16:creationId xmlns:a16="http://schemas.microsoft.com/office/drawing/2014/main" id="{EE681EA3-9507-A243-9D02-83DFA60D727C}"/>
+              </a:ext>
+            </a:extLst>
+          </p:cNvPr>
+          <p:cNvPicPr>
+            <a:picLocks noChangeAspect="1"/>
+          </p:cNvPicPr>
+          <p:nvPr/>
+        </p:nvPicPr>
+        <p:blipFill>
+          <a:blip r:embed="rId28">
+            <a:extLst>
+              <a:ext uri="{96DAC541-7B7A-43D3-8B79-37D633B846F1}">
+                <asvg:svgBlip xmlns:asvg="http://schemas.microsoft.com/office/drawing/2016/SVG/main" r:embed="rId29"/>
+              </a:ext>
+            </a:extLst>
+          </a:blip>
+          <a:stretch>
+            <a:fillRect/>
+          </a:stretch>
+        </p:blipFill>
+        <p:spPr>
+          <a:xfrm>
+            <a:off x="8306317" y="2508823"/>
+            <a:ext cx="453443" cy="453443"/>
+          </a:xfrm>
+          <a:prstGeom prst="rect">
+            <a:avLst/>
+          </a:prstGeom>
+        </p:spPr>
+      </p:pic>
+      <p:grpSp>
+        <p:nvGrpSpPr>
+          <p:cNvPr id="82" name="Group 81">
+            <a:extLst>
+              <a:ext uri="{FF2B5EF4-FFF2-40B4-BE49-F238E27FC236}">
+                <a16:creationId xmlns:a16="http://schemas.microsoft.com/office/drawing/2014/main" id="{00FC0BCE-C30A-8243-A679-9210F08CA0C8}"/>
+              </a:ext>
+            </a:extLst>
+          </p:cNvPr>
+          <p:cNvGrpSpPr/>
+          <p:nvPr/>
+        </p:nvGrpSpPr>
+        <p:grpSpPr>
+          <a:xfrm>
+            <a:off x="6019602" y="3473921"/>
+            <a:ext cx="421217" cy="352147"/>
+            <a:chOff x="5949236" y="1132976"/>
+            <a:chExt cx="421217" cy="352147"/>
+          </a:xfrm>
+        </p:grpSpPr>
+        <p:pic>
+          <p:nvPicPr>
+            <p:cNvPr id="83" name="Picture 28" descr="Azureml Tensorflow 2.4 Inference GPU Image by Microsoft | Docker Hub">
+              <a:extLst>
+                <a:ext uri="{FF2B5EF4-FFF2-40B4-BE49-F238E27FC236}">
+                  <a16:creationId xmlns:a16="http://schemas.microsoft.com/office/drawing/2014/main" id="{13209E30-2639-B344-91D5-BC89B1268BEF}"/>
+                </a:ext>
+              </a:extLst>
+            </p:cNvPr>
+            <p:cNvPicPr>
+              <a:picLocks noChangeAspect="1" noChangeArrowheads="1"/>
+            </p:cNvPicPr>
+            <p:nvPr/>
+          </p:nvPicPr>
+          <p:blipFill>
+            <a:blip r:embed="rId15">
+              <a:extLst>
+                <a:ext uri="{BEBA8EAE-BF5A-486C-A8C5-ECC9F3942E4B}">
+                  <a14:imgProps xmlns:a14="http://schemas.microsoft.com/office/drawing/2010/main">
+                    <a14:imgLayer r:embed="rId30">
+                      <a14:imgEffect>
+                        <a14:backgroundRemoval t="1778" b="96889" l="4000" r="93778">
+                          <a14:foregroundMark x1="56444" y1="6667" x2="49333" y2="8889"/>
+                          <a14:foregroundMark x1="48000" y1="2222" x2="53778" y2="3111"/>
+                          <a14:foregroundMark x1="6222" y1="76889" x2="10222" y2="93333"/>
+                          <a14:foregroundMark x1="10222" y1="93333" x2="13778" y2="97333"/>
+                          <a14:foregroundMark x1="4444" y1="78222" x2="4889" y2="80000"/>
+                          <a14:foregroundMark x1="74222" y1="68889" x2="81333" y2="84889"/>
+                          <a14:foregroundMark x1="81333" y1="84889" x2="43111" y2="88889"/>
+                          <a14:foregroundMark x1="28889" y1="86667" x2="58222" y2="88889"/>
+                          <a14:foregroundMark x1="58222" y1="88889" x2="75111" y2="87556"/>
+                          <a14:foregroundMark x1="75111" y1="87556" x2="75111" y2="87556"/>
+                          <a14:foregroundMark x1="25333" y1="88000" x2="58222" y2="95111"/>
+                          <a14:foregroundMark x1="58222" y1="95111" x2="66222" y2="93778"/>
+                          <a14:foregroundMark x1="19556" y1="92889" x2="47556" y2="93778"/>
+                          <a14:foregroundMark x1="47556" y1="93778" x2="71556" y2="90667"/>
+                          <a14:foregroundMark x1="71556" y1="90667" x2="73333" y2="89333"/>
+                          <a14:foregroundMark x1="93778" y1="78667" x2="92000" y2="80889"/>
+                        </a14:backgroundRemoval>
+                      </a14:imgEffect>
+                    </a14:imgLayer>
+                  </a14:imgProps>
+                </a:ext>
+                <a:ext uri="{28A0092B-C50C-407E-A947-70E740481C1C}">
+                  <a14:useLocalDpi xmlns:a14="http://schemas.microsoft.com/office/drawing/2010/main" val="0"/>
+                </a:ext>
+              </a:extLst>
+            </a:blip>
+            <a:srcRect/>
+            <a:stretch>
+              <a:fillRect/>
+            </a:stretch>
+          </p:blipFill>
+          <p:spPr bwMode="auto">
+            <a:xfrm>
+              <a:off x="5949236" y="1164411"/>
+              <a:ext cx="320712" cy="320712"/>
+            </a:xfrm>
+            <a:prstGeom prst="rect">
+              <a:avLst/>
+            </a:prstGeom>
+            <a:noFill/>
+            <a:extLst>
+              <a:ext uri="{909E8E84-426E-40DD-AFC4-6F175D3DCCD1}">
+                <a14:hiddenFill xmlns:a14="http://schemas.microsoft.com/office/drawing/2010/main">
+                  <a:solidFill>
+                    <a:srgbClr val="FFFFFF"/>
+                  </a:solidFill>
+                </a14:hiddenFill>
+              </a:ext>
+            </a:extLst>
+          </p:spPr>
+        </p:pic>
+        <p:pic>
+          <p:nvPicPr>
+            <p:cNvPr id="84" name="Picture 42" descr="Azure Icon #165842 - Free Icons Library">
+              <a:extLst>
+                <a:ext uri="{FF2B5EF4-FFF2-40B4-BE49-F238E27FC236}">
+                  <a16:creationId xmlns:a16="http://schemas.microsoft.com/office/drawing/2014/main" id="{FC47531C-13BE-9F4C-83BB-6471BA771679}"/>
+                </a:ext>
+              </a:extLst>
+            </p:cNvPr>
+            <p:cNvPicPr>
+              <a:picLocks noChangeAspect="1" noChangeArrowheads="1"/>
+            </p:cNvPicPr>
+            <p:nvPr/>
+          </p:nvPicPr>
+          <p:blipFill>
+            <a:blip r:embed="rId27">
+              <a:extLst>
+                <a:ext uri="{28A0092B-C50C-407E-A947-70E740481C1C}">
+                  <a14:useLocalDpi xmlns:a14="http://schemas.microsoft.com/office/drawing/2010/main" val="0"/>
+                </a:ext>
+              </a:extLst>
+            </a:blip>
+            <a:srcRect/>
+            <a:stretch>
+              <a:fillRect/>
+            </a:stretch>
+          </p:blipFill>
+          <p:spPr bwMode="auto">
+            <a:xfrm>
+              <a:off x="6118303" y="1132976"/>
+              <a:ext cx="252150" cy="252150"/>
+            </a:xfrm>
+            <a:prstGeom prst="rect">
+              <a:avLst/>
+            </a:prstGeom>
+            <a:noFill/>
+            <a:extLst>
+              <a:ext uri="{909E8E84-426E-40DD-AFC4-6F175D3DCCD1}">
+                <a14:hiddenFill xmlns:a14="http://schemas.microsoft.com/office/drawing/2010/main">
+                  <a:solidFill>
+                    <a:srgbClr val="FFFFFF"/>
+                  </a:solidFill>
+                </a14:hiddenFill>
+              </a:ext>
+            </a:extLst>
+          </p:spPr>
+        </p:pic>
+      </p:grpSp>
+      <p:pic>
+        <p:nvPicPr>
+          <p:cNvPr id="1068" name="Picture 44" descr="Azure Container Registry-icon | Brands AP - AZ">
+            <a:extLst>
+              <a:ext uri="{FF2B5EF4-FFF2-40B4-BE49-F238E27FC236}">
+                <a16:creationId xmlns:a16="http://schemas.microsoft.com/office/drawing/2014/main" id="{C28EE840-6D5B-574B-8845-ED9E590A5805}"/>
+              </a:ext>
+            </a:extLst>
+          </p:cNvPr>
+          <p:cNvPicPr>
+            <a:picLocks noChangeAspect="1" noChangeArrowheads="1"/>
+          </p:cNvPicPr>
+          <p:nvPr/>
+        </p:nvPicPr>
+        <p:blipFill>
+          <a:blip r:embed="rId31">
+            <a:extLst>
+              <a:ext uri="{28A0092B-C50C-407E-A947-70E740481C1C}">
+                <a14:useLocalDpi xmlns:a14="http://schemas.microsoft.com/office/drawing/2010/main" val="0"/>
+              </a:ext>
+            </a:extLst>
+          </a:blip>
+          <a:srcRect/>
+          <a:stretch>
+            <a:fillRect/>
+          </a:stretch>
+        </p:blipFill>
+        <p:spPr bwMode="auto">
+          <a:xfrm>
+            <a:off x="8350796" y="4685333"/>
+            <a:ext cx="3098800" cy="2628900"/>
+          </a:xfrm>
+          <a:prstGeom prst="rect">
+            <a:avLst/>
+          </a:prstGeom>
+          <a:noFill/>
+          <a:extLst>
+            <a:ext uri="{909E8E84-426E-40DD-AFC4-6F175D3DCCD1}">
+              <a14:hiddenFill xmlns:a14="http://schemas.microsoft.com/office/drawing/2010/main">
+                <a:solidFill>
+                  <a:srgbClr val="FFFFFF"/>
+                </a:solidFill>
+              </a14:hiddenFill>
+            </a:ext>
+          </a:extLst>
+        </p:spPr>
+      </p:pic>
+      <p:sp>
+        <p:nvSpPr>
+          <p:cNvPr id="86" name="TextBox 85">
+            <a:extLst>
+              <a:ext uri="{FF2B5EF4-FFF2-40B4-BE49-F238E27FC236}">
+                <a16:creationId xmlns:a16="http://schemas.microsoft.com/office/drawing/2014/main" id="{A42DA294-43B6-2649-87B9-47283E994218}"/>
+              </a:ext>
+            </a:extLst>
+          </p:cNvPr>
+          <p:cNvSpPr txBox="1"/>
+          <p:nvPr/>
+        </p:nvSpPr>
+        <p:spPr>
+          <a:xfrm>
+            <a:off x="7987993" y="2915212"/>
+            <a:ext cx="1029199" cy="261610"/>
+          </a:xfrm>
+          <a:prstGeom prst="rect">
+            <a:avLst/>
+          </a:prstGeom>
+          <a:noFill/>
+        </p:spPr>
+        <p:txBody>
+          <a:bodyPr wrap="square" rtlCol="0">
+            <a:spAutoFit/>
+          </a:bodyPr>
+          <a:lstStyle/>
+          <a:p>
+            <a:r>
+              <a:rPr lang="en-US" sz="1100" dirty="0"/>
+              <a:t>Benchmarking</a:t>
+            </a:r>
+            <a:endParaRPr lang="en-TH" sz="1100" dirty="0"/>
+          </a:p>
+        </p:txBody>
+      </p:sp>
+      <p:sp>
+        <p:nvSpPr>
+          <p:cNvPr id="87" name="TextBox 86">
+            <a:extLst>
+              <a:ext uri="{FF2B5EF4-FFF2-40B4-BE49-F238E27FC236}">
+                <a16:creationId xmlns:a16="http://schemas.microsoft.com/office/drawing/2014/main" id="{65C227D9-0A61-5C44-A671-BFFA4ED62B49}"/>
+              </a:ext>
+            </a:extLst>
+          </p:cNvPr>
+          <p:cNvSpPr txBox="1"/>
+          <p:nvPr/>
+        </p:nvSpPr>
+        <p:spPr>
+          <a:xfrm>
+            <a:off x="6711221" y="3023913"/>
+            <a:ext cx="1029199" cy="261610"/>
+          </a:xfrm>
+          <a:prstGeom prst="rect">
+            <a:avLst/>
+          </a:prstGeom>
+          <a:noFill/>
+        </p:spPr>
+        <p:txBody>
+          <a:bodyPr wrap="square" rtlCol="0">
+            <a:spAutoFit/>
+          </a:bodyPr>
+          <a:lstStyle/>
+          <a:p>
+            <a:r>
+              <a:rPr lang="en-US" sz="1100" dirty="0"/>
+              <a:t>AML Pipeline</a:t>
+            </a:r>
+            <a:endParaRPr lang="en-TH" sz="1100" dirty="0"/>
+          </a:p>
+        </p:txBody>
+      </p:sp>
+      <p:grpSp>
+        <p:nvGrpSpPr>
+          <p:cNvPr id="89" name="Group 88">
+            <a:extLst>
+              <a:ext uri="{FF2B5EF4-FFF2-40B4-BE49-F238E27FC236}">
+                <a16:creationId xmlns:a16="http://schemas.microsoft.com/office/drawing/2014/main" id="{3D6D48C4-B884-7E4E-BF0F-078EC59B4388}"/>
+              </a:ext>
+            </a:extLst>
+          </p:cNvPr>
+          <p:cNvGrpSpPr/>
+          <p:nvPr/>
+        </p:nvGrpSpPr>
+        <p:grpSpPr>
+          <a:xfrm>
+            <a:off x="7290222" y="4058282"/>
+            <a:ext cx="458121" cy="394245"/>
+            <a:chOff x="3627237" y="2135301"/>
+            <a:chExt cx="662265" cy="569925"/>
+          </a:xfrm>
+        </p:grpSpPr>
+        <p:pic>
+          <p:nvPicPr>
+            <p:cNvPr id="90" name="Picture 28" descr="Azureml Tensorflow 2.4 Inference GPU Image by Microsoft | Docker Hub">
+              <a:extLst>
+                <a:ext uri="{FF2B5EF4-FFF2-40B4-BE49-F238E27FC236}">
+                  <a16:creationId xmlns:a16="http://schemas.microsoft.com/office/drawing/2014/main" id="{8D91A542-A64D-DB48-B546-1E30E9F6226E}"/>
+                </a:ext>
+              </a:extLst>
+            </p:cNvPr>
+            <p:cNvPicPr>
+              <a:picLocks noChangeAspect="1" noChangeArrowheads="1"/>
+            </p:cNvPicPr>
+            <p:nvPr/>
+          </p:nvPicPr>
+          <p:blipFill>
+            <a:blip r:embed="rId15">
+              <a:extLst>
+                <a:ext uri="{BEBA8EAE-BF5A-486C-A8C5-ECC9F3942E4B}">
+                  <a14:imgProps xmlns:a14="http://schemas.microsoft.com/office/drawing/2010/main">
+                    <a14:imgLayer r:embed="rId32">
+                      <a14:imgEffect>
+                        <a14:backgroundRemoval t="1778" b="96889" l="4000" r="93778">
+                          <a14:foregroundMark x1="56444" y1="6667" x2="49333" y2="8889"/>
+                          <a14:foregroundMark x1="48000" y1="2222" x2="53778" y2="3111"/>
+                          <a14:foregroundMark x1="6222" y1="76889" x2="10222" y2="93333"/>
+                          <a14:foregroundMark x1="10222" y1="93333" x2="13778" y2="97333"/>
+                          <a14:foregroundMark x1="4444" y1="78222" x2="4889" y2="80000"/>
+                          <a14:foregroundMark x1="74222" y1="68889" x2="81333" y2="84889"/>
+                          <a14:foregroundMark x1="81333" y1="84889" x2="43111" y2="88889"/>
+                          <a14:foregroundMark x1="28889" y1="86667" x2="58222" y2="88889"/>
+                          <a14:foregroundMark x1="58222" y1="88889" x2="75111" y2="87556"/>
+                          <a14:foregroundMark x1="75111" y1="87556" x2="75111" y2="87556"/>
+                          <a14:foregroundMark x1="25333" y1="88000" x2="58222" y2="95111"/>
+                          <a14:foregroundMark x1="58222" y1="95111" x2="66222" y2="93778"/>
+                          <a14:foregroundMark x1="19556" y1="92889" x2="47556" y2="93778"/>
+                          <a14:foregroundMark x1="47556" y1="93778" x2="71556" y2="90667"/>
+                          <a14:foregroundMark x1="71556" y1="90667" x2="73333" y2="89333"/>
+                          <a14:foregroundMark x1="93778" y1="78667" x2="92000" y2="80889"/>
+                        </a14:backgroundRemoval>
+                      </a14:imgEffect>
+                    </a14:imgLayer>
+                  </a14:imgProps>
+                </a:ext>
+                <a:ext uri="{28A0092B-C50C-407E-A947-70E740481C1C}">
+                  <a14:useLocalDpi xmlns:a14="http://schemas.microsoft.com/office/drawing/2010/main" val="0"/>
+                </a:ext>
+              </a:extLst>
+            </a:blip>
+            <a:srcRect/>
+            <a:stretch>
+              <a:fillRect/>
+            </a:stretch>
+          </p:blipFill>
+          <p:spPr bwMode="auto">
+            <a:xfrm>
+              <a:off x="3627237" y="2135301"/>
+              <a:ext cx="481282" cy="481282"/>
+            </a:xfrm>
+            <a:prstGeom prst="rect">
+              <a:avLst/>
+            </a:prstGeom>
+            <a:noFill/>
+            <a:extLst>
+              <a:ext uri="{909E8E84-426E-40DD-AFC4-6F175D3DCCD1}">
+                <a14:hiddenFill xmlns:a14="http://schemas.microsoft.com/office/drawing/2010/main">
+                  <a:solidFill>
+                    <a:srgbClr val="FFFFFF"/>
+                  </a:solidFill>
+                </a14:hiddenFill>
+              </a:ext>
+            </a:extLst>
+          </p:spPr>
+        </p:pic>
+        <p:pic>
+          <p:nvPicPr>
+            <p:cNvPr id="91" name="Picture 26" descr="Data Services - SQL Database (US Gov AZ) / Prem PRS6 DB Days | TW Micronics">
+              <a:extLst>
+                <a:ext uri="{FF2B5EF4-FFF2-40B4-BE49-F238E27FC236}">
+                  <a16:creationId xmlns:a16="http://schemas.microsoft.com/office/drawing/2014/main" id="{8358C240-89DA-6B4C-BA99-CA5DAA264E20}"/>
+                </a:ext>
+              </a:extLst>
+            </p:cNvPr>
+            <p:cNvPicPr>
+              <a:picLocks noChangeAspect="1" noChangeArrowheads="1"/>
+            </p:cNvPicPr>
+            <p:nvPr/>
+          </p:nvPicPr>
+          <p:blipFill rotWithShape="1">
+            <a:blip r:embed="rId17">
+              <a:extLst>
+                <a:ext uri="{BEBA8EAE-BF5A-486C-A8C5-ECC9F3942E4B}">
+                  <a14:imgProps xmlns:a14="http://schemas.microsoft.com/office/drawing/2010/main">
+                    <a14:imgLayer r:embed="rId18">
+                      <a14:imgEffect>
+                        <a14:backgroundRemoval t="36000" b="64667" l="69167" r="99167">
+                          <a14:foregroundMark x1="69583" y1="45333" x2="69583" y2="58667"/>
+                          <a14:foregroundMark x1="95000" y1="43333" x2="94583" y2="57333"/>
+                          <a14:foregroundMark x1="94583" y1="57333" x2="94167" y2="58667"/>
+                          <a14:foregroundMark x1="97500" y1="44667" x2="97500" y2="55333"/>
+                          <a14:foregroundMark x1="97500" y1="45333" x2="97500" y2="53333"/>
+                          <a14:foregroundMark x1="97500" y1="45333" x2="97917" y2="55333"/>
+                          <a14:foregroundMark x1="98333" y1="46667" x2="98750" y2="56667"/>
+                          <a14:foregroundMark x1="98333" y1="44667" x2="98750" y2="55333"/>
+                          <a14:foregroundMark x1="99167" y1="46000" x2="99167" y2="57333"/>
+                          <a14:foregroundMark x1="72083" y1="54000" x2="71667" y2="53333"/>
+                          <a14:foregroundMark x1="71250" y1="52667" x2="71250" y2="56000"/>
+                        </a14:backgroundRemoval>
+                      </a14:imgEffect>
+                    </a14:imgLayer>
+                  </a14:imgProps>
+                </a:ext>
+                <a:ext uri="{28A0092B-C50C-407E-A947-70E740481C1C}">
+                  <a14:useLocalDpi xmlns:a14="http://schemas.microsoft.com/office/drawing/2010/main" val="0"/>
+                </a:ext>
+              </a:extLst>
+            </a:blip>
+            <a:srcRect l="66254" t="32470" b="31357"/>
+            <a:stretch/>
+          </p:blipFill>
+          <p:spPr bwMode="auto">
+            <a:xfrm>
+              <a:off x="3849422" y="2410401"/>
+              <a:ext cx="440080" cy="294825"/>
+            </a:xfrm>
+            <a:prstGeom prst="rect">
+              <a:avLst/>
+            </a:prstGeom>
+            <a:noFill/>
+            <a:extLst>
+              <a:ext uri="{909E8E84-426E-40DD-AFC4-6F175D3DCCD1}">
+                <a14:hiddenFill xmlns:a14="http://schemas.microsoft.com/office/drawing/2010/main">
+                  <a:solidFill>
+                    <a:srgbClr val="FFFFFF"/>
+                  </a:solidFill>
+                </a14:hiddenFill>
+              </a:ext>
+            </a:extLst>
+          </p:spPr>
+        </p:pic>
+      </p:grpSp>
+      <p:cxnSp>
+        <p:nvCxnSpPr>
+          <p:cNvPr id="45" name="Elbow Connector 44">
+            <a:extLst>
+              <a:ext uri="{FF2B5EF4-FFF2-40B4-BE49-F238E27FC236}">
+                <a16:creationId xmlns:a16="http://schemas.microsoft.com/office/drawing/2014/main" id="{B54D0AEE-C486-5741-9844-F7B900202BE5}"/>
+              </a:ext>
+            </a:extLst>
+          </p:cNvPr>
+          <p:cNvCxnSpPr>
+            <a:cxnSpLocks/>
+            <a:stCxn id="26" idx="3"/>
+            <a:endCxn id="55" idx="1"/>
+          </p:cNvCxnSpPr>
+          <p:nvPr/>
+        </p:nvCxnSpPr>
+        <p:spPr>
+          <a:xfrm flipV="1">
+            <a:off x="4315162" y="1832956"/>
+            <a:ext cx="288758" cy="1202246"/>
+          </a:xfrm>
+          <a:prstGeom prst="bentConnector3">
+            <a:avLst/>
+          </a:prstGeom>
+          <a:ln>
+            <a:tailEnd type="triangle"/>
+          </a:ln>
+        </p:spPr>
+        <p:style>
+          <a:lnRef idx="1">
+            <a:schemeClr val="dk1"/>
+          </a:lnRef>
+          <a:fillRef idx="0">
+            <a:schemeClr val="dk1"/>
+          </a:fillRef>
+          <a:effectRef idx="0">
+            <a:schemeClr val="dk1"/>
+          </a:effectRef>
+          <a:fontRef idx="minor">
+            <a:schemeClr val="tx1"/>
+          </a:fontRef>
+        </p:style>
+      </p:cxnSp>
     </p:spTree>
     <p:extLst>
       <p:ext uri="{BB962C8B-B14F-4D97-AF65-F5344CB8AC3E}">
         <p14:creationId xmlns:p14="http://schemas.microsoft.com/office/powerpoint/2010/main" val="1001866802"/>
+      </p:ext>
+    </p:extLst>
+  </p:cSld>
+  <p:clrMapOvr>
+    <a:masterClrMapping/>
+  </p:clrMapOvr>
+</p:sld>
+</file>
+
+<file path=ppt/slides/slide2.xml><?xml version="1.0" encoding="utf-8"?>
+<p:sld xmlns:a="http://schemas.openxmlformats.org/drawingml/2006/main" xmlns:r="http://schemas.openxmlformats.org/officeDocument/2006/relationships" xmlns:p="http://schemas.openxmlformats.org/presentationml/2006/main">
+  <p:cSld>
+    <p:bg>
+      <p:bgPr>
+        <a:solidFill>
+          <a:schemeClr val="bg1"/>
+        </a:solidFill>
+        <a:effectLst/>
+      </p:bgPr>
+    </p:bg>
+    <p:spTree>
+      <p:nvGrpSpPr>
+        <p:cNvPr id="1" name=""/>
+        <p:cNvGrpSpPr/>
+        <p:nvPr/>
+      </p:nvGrpSpPr>
+      <p:grpSpPr>
+        <a:xfrm>
+          <a:off x="0" y="0"/>
+          <a:ext cx="0" cy="0"/>
+          <a:chOff x="0" y="0"/>
+          <a:chExt cx="0" cy="0"/>
+        </a:xfrm>
+      </p:grpSpPr>
+      <p:pic>
+        <p:nvPicPr>
+          <p:cNvPr id="31" name="Graphic 30">
+            <a:extLst>
+              <a:ext uri="{FF2B5EF4-FFF2-40B4-BE49-F238E27FC236}">
+                <a16:creationId xmlns:a16="http://schemas.microsoft.com/office/drawing/2014/main" id="{BA519C2D-EB72-A542-AFF8-DA2C3200B684}"/>
+              </a:ext>
+            </a:extLst>
+          </p:cNvPr>
+          <p:cNvPicPr>
+            <a:picLocks noChangeAspect="1"/>
+          </p:cNvPicPr>
+          <p:nvPr/>
+        </p:nvPicPr>
+        <p:blipFill>
+          <a:blip r:embed="rId2">
+            <a:extLst>
+              <a:ext uri="{96DAC541-7B7A-43D3-8B79-37D633B846F1}">
+                <asvg:svgBlip xmlns:asvg="http://schemas.microsoft.com/office/drawing/2016/SVG/main" r:embed="rId3"/>
+              </a:ext>
+            </a:extLst>
+          </a:blip>
+          <a:stretch>
+            <a:fillRect/>
+          </a:stretch>
+        </p:blipFill>
+        <p:spPr>
+          <a:xfrm>
+            <a:off x="951021" y="611802"/>
+            <a:ext cx="2624663" cy="2624663"/>
+          </a:xfrm>
+          <a:prstGeom prst="rect">
+            <a:avLst/>
+          </a:prstGeom>
+        </p:spPr>
+      </p:pic>
+      <p:pic>
+        <p:nvPicPr>
+          <p:cNvPr id="29" name="Graphic 28">
+            <a:extLst>
+              <a:ext uri="{FF2B5EF4-FFF2-40B4-BE49-F238E27FC236}">
+                <a16:creationId xmlns:a16="http://schemas.microsoft.com/office/drawing/2014/main" id="{92B7837A-03C9-F94B-859D-52A7203240AC}"/>
+              </a:ext>
+            </a:extLst>
+          </p:cNvPr>
+          <p:cNvPicPr>
+            <a:picLocks noChangeAspect="1"/>
+          </p:cNvPicPr>
+          <p:nvPr/>
+        </p:nvPicPr>
+        <p:blipFill>
+          <a:blip r:embed="rId4">
+            <a:extLst>
+              <a:ext uri="{96DAC541-7B7A-43D3-8B79-37D633B846F1}">
+                <asvg:svgBlip xmlns:asvg="http://schemas.microsoft.com/office/drawing/2016/SVG/main" r:embed="rId5"/>
+              </a:ext>
+            </a:extLst>
+          </a:blip>
+          <a:stretch>
+            <a:fillRect/>
+          </a:stretch>
+        </p:blipFill>
+        <p:spPr>
+          <a:xfrm>
+            <a:off x="8616317" y="643466"/>
+            <a:ext cx="2624662" cy="2624662"/>
+          </a:xfrm>
+          <a:prstGeom prst="rect">
+            <a:avLst/>
+          </a:prstGeom>
+        </p:spPr>
+      </p:pic>
+      <p:pic>
+        <p:nvPicPr>
+          <p:cNvPr id="33" name="Graphic 32">
+            <a:extLst>
+              <a:ext uri="{FF2B5EF4-FFF2-40B4-BE49-F238E27FC236}">
+                <a16:creationId xmlns:a16="http://schemas.microsoft.com/office/drawing/2014/main" id="{1C96D818-1650-0349-9960-E588445892AB}"/>
+              </a:ext>
+            </a:extLst>
+          </p:cNvPr>
+          <p:cNvPicPr>
+            <a:picLocks noChangeAspect="1"/>
+          </p:cNvPicPr>
+          <p:nvPr/>
+        </p:nvPicPr>
+        <p:blipFill>
+          <a:blip r:embed="rId6">
+            <a:extLst>
+              <a:ext uri="{96DAC541-7B7A-43D3-8B79-37D633B846F1}">
+                <asvg:svgBlip xmlns:asvg="http://schemas.microsoft.com/office/drawing/2016/SVG/main" r:embed="rId7"/>
+              </a:ext>
+            </a:extLst>
+          </a:blip>
+          <a:stretch>
+            <a:fillRect/>
+          </a:stretch>
+        </p:blipFill>
+        <p:spPr>
+          <a:xfrm>
+            <a:off x="970280" y="3589863"/>
+            <a:ext cx="2624665" cy="2624665"/>
+          </a:xfrm>
+          <a:prstGeom prst="rect">
+            <a:avLst/>
+          </a:prstGeom>
+        </p:spPr>
+      </p:pic>
+      <p:pic>
+        <p:nvPicPr>
+          <p:cNvPr id="35" name="Graphic 34">
+            <a:extLst>
+              <a:ext uri="{FF2B5EF4-FFF2-40B4-BE49-F238E27FC236}">
+                <a16:creationId xmlns:a16="http://schemas.microsoft.com/office/drawing/2014/main" id="{E32DE30D-E4FA-6448-9FB4-6386C26C4BBB}"/>
+              </a:ext>
+            </a:extLst>
+          </p:cNvPr>
+          <p:cNvPicPr>
+            <a:picLocks noChangeAspect="1"/>
+          </p:cNvPicPr>
+          <p:nvPr/>
+        </p:nvPicPr>
+        <p:blipFill>
+          <a:blip r:embed="rId8">
+            <a:extLst>
+              <a:ext uri="{96DAC541-7B7A-43D3-8B79-37D633B846F1}">
+                <asvg:svgBlip xmlns:asvg="http://schemas.microsoft.com/office/drawing/2016/SVG/main" r:embed="rId9"/>
+              </a:ext>
+            </a:extLst>
+          </a:blip>
+          <a:stretch>
+            <a:fillRect/>
+          </a:stretch>
+        </p:blipFill>
+        <p:spPr>
+          <a:xfrm>
+            <a:off x="4793266" y="3589863"/>
+            <a:ext cx="2643993" cy="2643993"/>
+          </a:xfrm>
+          <a:prstGeom prst="rect">
+            <a:avLst/>
+          </a:prstGeom>
+        </p:spPr>
+      </p:pic>
+      <p:pic>
+        <p:nvPicPr>
+          <p:cNvPr id="27" name="Graphic 26">
+            <a:extLst>
+              <a:ext uri="{FF2B5EF4-FFF2-40B4-BE49-F238E27FC236}">
+                <a16:creationId xmlns:a16="http://schemas.microsoft.com/office/drawing/2014/main" id="{060DB71E-65E2-B84A-8704-6892B11C1859}"/>
+              </a:ext>
+            </a:extLst>
+          </p:cNvPr>
+          <p:cNvPicPr>
+            <a:picLocks noChangeAspect="1"/>
+          </p:cNvPicPr>
+          <p:nvPr/>
+        </p:nvPicPr>
+        <p:blipFill>
+          <a:blip r:embed="rId10">
+            <a:extLst>
+              <a:ext uri="{96DAC541-7B7A-43D3-8B79-37D633B846F1}">
+                <asvg:svgBlip xmlns:asvg="http://schemas.microsoft.com/office/drawing/2016/SVG/main" r:embed="rId11"/>
+              </a:ext>
+            </a:extLst>
+          </a:blip>
+          <a:stretch>
+            <a:fillRect/>
+          </a:stretch>
+        </p:blipFill>
+        <p:spPr>
+          <a:xfrm>
+            <a:off x="8606651" y="3589863"/>
+            <a:ext cx="2643992" cy="2643992"/>
+          </a:xfrm>
+          <a:prstGeom prst="rect">
+            <a:avLst/>
+          </a:prstGeom>
+        </p:spPr>
+      </p:pic>
+    </p:spTree>
+    <p:extLst>
+      <p:ext uri="{BB962C8B-B14F-4D97-AF65-F5344CB8AC3E}">
+        <p14:creationId xmlns:p14="http://schemas.microsoft.com/office/powerpoint/2010/main" val="397691902"/>
       </p:ext>
     </p:extLst>
   </p:cSld>

</xml_diff>

<commit_message>
Add transfer file to azure VM
</commit_message>
<xml_diff>
--- a/Fraud-Detection/fraud-detect.pptx
+++ b/Fraud-Detection/fraud-detect.pptx
@@ -3357,7 +3357,7 @@
         </p:nvSpPr>
         <p:spPr>
           <a:xfrm>
-            <a:off x="472743" y="4586203"/>
+            <a:off x="480339" y="4285681"/>
             <a:ext cx="1898750" cy="1710519"/>
           </a:xfrm>
           <a:prstGeom prst="roundRect">
@@ -3412,7 +3412,7 @@
         </p:nvSpPr>
         <p:spPr>
           <a:xfrm>
-            <a:off x="4378708" y="3597434"/>
+            <a:off x="4546614" y="3606663"/>
             <a:ext cx="1884482" cy="1620449"/>
           </a:xfrm>
           <a:prstGeom prst="roundRect">
@@ -3522,7 +3522,7 @@
         </p:nvSpPr>
         <p:spPr>
           <a:xfrm>
-            <a:off x="1304286" y="2595322"/>
+            <a:off x="1170006" y="2589548"/>
             <a:ext cx="3010876" cy="879760"/>
           </a:xfrm>
           <a:prstGeom prst="roundRect">
@@ -3626,7 +3626,7 @@
         </p:blipFill>
         <p:spPr>
           <a:xfrm>
-            <a:off x="1683743" y="4653884"/>
+            <a:off x="1691339" y="4353362"/>
             <a:ext cx="393491" cy="393491"/>
           </a:xfrm>
           <a:prstGeom prst="rect">
@@ -3662,7 +3662,7 @@
         </p:blipFill>
         <p:spPr>
           <a:xfrm>
-            <a:off x="1934588" y="4242497"/>
+            <a:off x="1942184" y="3941975"/>
             <a:ext cx="316488" cy="316488"/>
           </a:xfrm>
           <a:prstGeom prst="rect">
@@ -3699,7 +3699,7 @@
         </p:blipFill>
         <p:spPr bwMode="auto">
           <a:xfrm>
-            <a:off x="1668034" y="5527634"/>
+            <a:off x="1675630" y="5227112"/>
             <a:ext cx="412579" cy="412579"/>
           </a:xfrm>
           <a:prstGeom prst="rect">
@@ -3782,7 +3782,7 @@
         </p:blipFill>
         <p:spPr bwMode="auto">
           <a:xfrm flipH="1">
-            <a:off x="1628950" y="2719875"/>
+            <a:off x="1494670" y="2714101"/>
             <a:ext cx="490745" cy="490745"/>
           </a:xfrm>
           <a:prstGeom prst="rect">
@@ -3850,7 +3850,7 @@
         </p:nvGrpSpPr>
         <p:grpSpPr>
           <a:xfrm>
-            <a:off x="535071" y="5091463"/>
+            <a:off x="542667" y="4790941"/>
             <a:ext cx="744254" cy="753350"/>
             <a:chOff x="535071" y="5091463"/>
             <a:chExt cx="744254" cy="753350"/>
@@ -4041,7 +4041,7 @@
         </p:blipFill>
         <p:spPr bwMode="auto">
           <a:xfrm>
-            <a:off x="2684661" y="2718949"/>
+            <a:off x="2550381" y="2713175"/>
             <a:ext cx="440080" cy="510101"/>
           </a:xfrm>
           <a:prstGeom prst="rect">
@@ -4073,7 +4073,7 @@
         </p:nvGrpSpPr>
         <p:grpSpPr>
           <a:xfrm>
-            <a:off x="3925046" y="2309109"/>
+            <a:off x="3790766" y="2303335"/>
             <a:ext cx="458121" cy="394245"/>
             <a:chOff x="3627237" y="2135301"/>
             <a:chExt cx="662265" cy="569925"/>
@@ -4322,7 +4322,7 @@
         </p:blipFill>
         <p:spPr bwMode="auto">
           <a:xfrm>
-            <a:off x="6984788" y="2504088"/>
+            <a:off x="6685462" y="2458858"/>
             <a:ext cx="534495" cy="534495"/>
           </a:xfrm>
           <a:prstGeom prst="rect">
@@ -4369,7 +4369,7 @@
         </p:blipFill>
         <p:spPr bwMode="auto">
           <a:xfrm>
-            <a:off x="4789242" y="3639881"/>
+            <a:off x="4957148" y="3649110"/>
             <a:ext cx="1001012" cy="500506"/>
           </a:xfrm>
           <a:prstGeom prst="rect">
@@ -4437,7 +4437,7 @@
         </p:blipFill>
         <p:spPr bwMode="auto">
           <a:xfrm>
-            <a:off x="5086668" y="4359480"/>
+            <a:off x="5254574" y="4368709"/>
             <a:ext cx="406159" cy="406159"/>
           </a:xfrm>
           <a:prstGeom prst="rect">
@@ -4469,7 +4469,7 @@
         </p:nvSpPr>
         <p:spPr>
           <a:xfrm>
-            <a:off x="4378708" y="3993795"/>
+            <a:off x="4546614" y="4003024"/>
             <a:ext cx="1956613" cy="261610"/>
           </a:xfrm>
           <a:prstGeom prst="rect">
@@ -4505,7 +4505,7 @@
         </p:nvSpPr>
         <p:spPr>
           <a:xfrm>
-            <a:off x="4361134" y="4724286"/>
+            <a:off x="4596290" y="4740099"/>
             <a:ext cx="1776979" cy="430887"/>
           </a:xfrm>
           <a:prstGeom prst="rect">
@@ -4726,7 +4726,7 @@
         </p:nvSpPr>
         <p:spPr>
           <a:xfrm>
-            <a:off x="535317" y="5868978"/>
+            <a:off x="542913" y="5568456"/>
             <a:ext cx="805774" cy="261610"/>
           </a:xfrm>
           <a:prstGeom prst="rect">
@@ -4763,7 +4763,7 @@
         </p:nvSpPr>
         <p:spPr>
           <a:xfrm>
-            <a:off x="1488024" y="5940213"/>
+            <a:off x="1495620" y="5639691"/>
             <a:ext cx="688629" cy="261610"/>
           </a:xfrm>
           <a:prstGeom prst="rect">
@@ -4799,7 +4799,7 @@
         </p:nvSpPr>
         <p:spPr>
           <a:xfrm>
-            <a:off x="1603792" y="5044599"/>
+            <a:off x="1611388" y="4744077"/>
             <a:ext cx="742523" cy="261610"/>
           </a:xfrm>
           <a:prstGeom prst="rect">
@@ -4839,7 +4839,7 @@
         </p:nvCxnSpPr>
         <p:spPr>
           <a:xfrm>
-            <a:off x="1279325" y="5601570"/>
+            <a:off x="1286921" y="5301048"/>
             <a:ext cx="388709" cy="132354"/>
           </a:xfrm>
           <a:prstGeom prst="bentConnector3">
@@ -4881,7 +4881,7 @@
         </p:nvCxnSpPr>
         <p:spPr>
           <a:xfrm rot="5400000" flipH="1" flipV="1">
-            <a:off x="1110612" y="4518333"/>
+            <a:off x="1118208" y="4217811"/>
             <a:ext cx="240833" cy="905429"/>
           </a:xfrm>
           <a:prstGeom prst="bentConnector2">
@@ -4923,8 +4923,8 @@
         </p:nvCxnSpPr>
         <p:spPr>
           <a:xfrm flipV="1">
-            <a:off x="1880489" y="3345674"/>
-            <a:ext cx="0" cy="1308210"/>
+            <a:off x="1888085" y="3379726"/>
+            <a:ext cx="0" cy="973636"/>
           </a:xfrm>
           <a:prstGeom prst="straightConnector1">
             <a:avLst/>
@@ -4962,7 +4962,7 @@
         </p:nvSpPr>
         <p:spPr>
           <a:xfrm>
-            <a:off x="2006076" y="4518800"/>
+            <a:off x="2013672" y="4218278"/>
             <a:ext cx="523475" cy="261610"/>
           </a:xfrm>
           <a:prstGeom prst="rect">
@@ -4997,7 +4997,7 @@
         </p:nvSpPr>
         <p:spPr>
           <a:xfrm>
-            <a:off x="1389907" y="3144367"/>
+            <a:off x="1255627" y="3138593"/>
             <a:ext cx="959754" cy="261610"/>
           </a:xfrm>
           <a:prstGeom prst="rect">
@@ -5034,7 +5034,7 @@
         </p:nvSpPr>
         <p:spPr>
           <a:xfrm>
-            <a:off x="3367344" y="3127738"/>
+            <a:off x="3233064" y="3121964"/>
             <a:ext cx="959754" cy="261610"/>
           </a:xfrm>
           <a:prstGeom prst="rect">
@@ -5086,7 +5086,7 @@
         </p:blipFill>
         <p:spPr bwMode="auto">
           <a:xfrm flipH="1">
-            <a:off x="3588780" y="2696098"/>
+            <a:off x="3454500" y="2690324"/>
             <a:ext cx="490745" cy="490745"/>
           </a:xfrm>
           <a:prstGeom prst="rect">
@@ -5118,7 +5118,7 @@
         </p:nvSpPr>
         <p:spPr>
           <a:xfrm>
-            <a:off x="2190048" y="3118116"/>
+            <a:off x="2055768" y="3112342"/>
             <a:ext cx="1398612" cy="261610"/>
           </a:xfrm>
           <a:prstGeom prst="rect">
@@ -5191,7 +5191,7 @@
         </p:nvGrpSpPr>
         <p:grpSpPr>
           <a:xfrm>
-            <a:off x="6019602" y="3473921"/>
+            <a:off x="6187508" y="3483150"/>
             <a:ext cx="421217" cy="352147"/>
             <a:chOff x="5949236" y="1132976"/>
             <a:chExt cx="421217" cy="352147"/>
@@ -5216,7 +5216,7 @@
               <a:extLst>
                 <a:ext uri="{BEBA8EAE-BF5A-486C-A8C5-ECC9F3942E4B}">
                   <a14:imgProps xmlns:a14="http://schemas.microsoft.com/office/drawing/2010/main">
-                    <a14:imgLayer r:embed="rId30">
+                    <a14:imgLayer r:embed="rId26">
                       <a14:imgEffect>
                         <a14:backgroundRemoval t="1778" b="96889" l="4000" r="93778">
                           <a14:foregroundMark x1="56444" y1="6667" x2="49333" y2="8889"/>
@@ -5333,7 +5333,7 @@
           <p:nvPr/>
         </p:nvPicPr>
         <p:blipFill>
-          <a:blip r:embed="rId31">
+          <a:blip r:embed="rId30">
             <a:extLst>
               <a:ext uri="{28A0092B-C50C-407E-A947-70E740481C1C}">
                 <a14:useLocalDpi xmlns:a14="http://schemas.microsoft.com/office/drawing/2010/main" val="0"/>
@@ -5347,8 +5347,8 @@
         </p:blipFill>
         <p:spPr bwMode="auto">
           <a:xfrm>
-            <a:off x="8350796" y="4685333"/>
-            <a:ext cx="3098800" cy="2628900"/>
+            <a:off x="8357352" y="1515876"/>
+            <a:ext cx="408964" cy="346949"/>
           </a:xfrm>
           <a:prstGeom prst="rect">
             <a:avLst/>
@@ -5415,8 +5415,8 @@
         </p:nvSpPr>
         <p:spPr>
           <a:xfrm>
-            <a:off x="6711221" y="3023913"/>
-            <a:ext cx="1029199" cy="261610"/>
+            <a:off x="6512115" y="2953128"/>
+            <a:ext cx="926090" cy="261610"/>
           </a:xfrm>
           <a:prstGeom prst="rect">
             <a:avLst/>
@@ -5476,7 +5476,7 @@
               <a:extLst>
                 <a:ext uri="{BEBA8EAE-BF5A-486C-A8C5-ECC9F3942E4B}">
                   <a14:imgProps xmlns:a14="http://schemas.microsoft.com/office/drawing/2010/main">
-                    <a14:imgLayer r:embed="rId32">
+                    <a14:imgLayer r:embed="rId26">
                       <a14:imgEffect>
                         <a14:backgroundRemoval t="1778" b="96889" l="4000" r="93778">
                           <a14:foregroundMark x1="56444" y1="6667" x2="49333" y2="8889"/>
@@ -5549,7 +5549,7 @@
               <a:extLst>
                 <a:ext uri="{BEBA8EAE-BF5A-486C-A8C5-ECC9F3942E4B}">
                   <a14:imgProps xmlns:a14="http://schemas.microsoft.com/office/drawing/2010/main">
-                    <a14:imgLayer r:embed="rId18">
+                    <a14:imgLayer r:embed="rId31">
                       <a14:imgEffect>
                         <a14:backgroundRemoval t="36000" b="64667" l="69167" r="99167">
                           <a14:foregroundMark x1="69583" y1="45333" x2="69583" y2="58667"/>
@@ -5615,11 +5615,56 @@
         </p:nvCxnSpPr>
         <p:spPr>
           <a:xfrm flipV="1">
-            <a:off x="4315162" y="1832956"/>
-            <a:ext cx="288758" cy="1202246"/>
+            <a:off x="4180882" y="1832956"/>
+            <a:ext cx="423038" cy="1196472"/>
           </a:xfrm>
           <a:prstGeom prst="bentConnector3">
             <a:avLst/>
+          </a:prstGeom>
+          <a:ln>
+            <a:tailEnd type="triangle"/>
+          </a:ln>
+        </p:spPr>
+        <p:style>
+          <a:lnRef idx="1">
+            <a:schemeClr val="dk1"/>
+          </a:lnRef>
+          <a:fillRef idx="0">
+            <a:schemeClr val="dk1"/>
+          </a:fillRef>
+          <a:effectRef idx="0">
+            <a:schemeClr val="dk1"/>
+          </a:effectRef>
+          <a:fontRef idx="minor">
+            <a:schemeClr val="tx1"/>
+          </a:fontRef>
+        </p:style>
+      </p:cxnSp>
+      <p:cxnSp>
+        <p:nvCxnSpPr>
+          <p:cNvPr id="51" name="Elbow Connector 50">
+            <a:extLst>
+              <a:ext uri="{FF2B5EF4-FFF2-40B4-BE49-F238E27FC236}">
+                <a16:creationId xmlns:a16="http://schemas.microsoft.com/office/drawing/2014/main" id="{261F4907-DD9E-744D-86E7-70861039E463}"/>
+              </a:ext>
+            </a:extLst>
+          </p:cNvPr>
+          <p:cNvCxnSpPr>
+            <a:cxnSpLocks/>
+            <a:stCxn id="26" idx="3"/>
+            <a:endCxn id="56" idx="1"/>
+          </p:cNvCxnSpPr>
+          <p:nvPr/>
+        </p:nvCxnSpPr>
+        <p:spPr>
+          <a:xfrm>
+            <a:off x="4180882" y="3029428"/>
+            <a:ext cx="365732" cy="1387460"/>
+          </a:xfrm>
+          <a:prstGeom prst="bentConnector3">
+            <a:avLst>
+              <a:gd name="adj1" fmla="val 58131"/>
+            </a:avLst>
           </a:prstGeom>
           <a:ln>
             <a:tailEnd type="triangle"/>

</xml_diff>